<commit_message>
Added Naval notes pics
</commit_message>
<xml_diff>
--- a/Talk_EmergingTechnologies_MES_March13.pptx
+++ b/Talk_EmergingTechnologies_MES_March13.pptx
@@ -4,9 +4,17 @@
   <p:sldMasterIdLst>
     <p:sldMasterId id="2147483648" r:id="rId1"/>
   </p:sldMasterIdLst>
+  <p:notesMasterIdLst>
+    <p:notesMasterId r:id="rId9"/>
+  </p:notesMasterIdLst>
   <p:sldIdLst>
     <p:sldId id="256" r:id="rId2"/>
     <p:sldId id="257" r:id="rId3"/>
+    <p:sldId id="258" r:id="rId4"/>
+    <p:sldId id="259" r:id="rId5"/>
+    <p:sldId id="262" r:id="rId6"/>
+    <p:sldId id="260" r:id="rId7"/>
+    <p:sldId id="261" r:id="rId8"/>
   </p:sldIdLst>
   <p:sldSz cx="12192000" cy="6858000"/>
   <p:notesSz cx="6858000" cy="9144000"/>
@@ -113,6 +121,355 @@
 </p:presentation>
 </file>
 
+<file path=ppt/notesMasters/notesMaster1.xml><?xml version="1.0" encoding="utf-8"?>
+<p:notesMaster xmlns:a="http://schemas.openxmlformats.org/drawingml/2006/main" xmlns:r="http://schemas.openxmlformats.org/officeDocument/2006/relationships" xmlns:p="http://schemas.openxmlformats.org/presentationml/2006/main">
+  <p:cSld>
+    <p:bg>
+      <p:bgRef idx="1001">
+        <a:schemeClr val="bg1"/>
+      </p:bgRef>
+    </p:bg>
+    <p:spTree>
+      <p:nvGrpSpPr>
+        <p:cNvPr id="1" name=""/>
+        <p:cNvGrpSpPr/>
+        <p:nvPr/>
+      </p:nvGrpSpPr>
+      <p:grpSpPr>
+        <a:xfrm>
+          <a:off x="0" y="0"/>
+          <a:ext cx="0" cy="0"/>
+          <a:chOff x="0" y="0"/>
+          <a:chExt cx="0" cy="0"/>
+        </a:xfrm>
+      </p:grpSpPr>
+      <p:sp>
+        <p:nvSpPr>
+          <p:cNvPr id="2" name="Header Placeholder 1"/>
+          <p:cNvSpPr>
+            <a:spLocks noGrp="1"/>
+          </p:cNvSpPr>
+          <p:nvPr>
+            <p:ph type="hdr" sz="quarter"/>
+          </p:nvPr>
+        </p:nvSpPr>
+        <p:spPr>
+          <a:xfrm>
+            <a:off x="0" y="0"/>
+            <a:ext cx="2971800" cy="458788"/>
+          </a:xfrm>
+          <a:prstGeom prst="rect">
+            <a:avLst/>
+          </a:prstGeom>
+        </p:spPr>
+        <p:txBody>
+          <a:bodyPr vert="horz" lIns="91440" tIns="45720" rIns="91440" bIns="45720" rtlCol="0"/>
+          <a:lstStyle>
+            <a:lvl1pPr algn="l">
+              <a:defRPr sz="1200"/>
+            </a:lvl1pPr>
+          </a:lstStyle>
+          <a:p>
+            <a:endParaRPr lang="en-US"/>
+          </a:p>
+        </p:txBody>
+      </p:sp>
+      <p:sp>
+        <p:nvSpPr>
+          <p:cNvPr id="3" name="Date Placeholder 2"/>
+          <p:cNvSpPr>
+            <a:spLocks noGrp="1"/>
+          </p:cNvSpPr>
+          <p:nvPr>
+            <p:ph type="dt" idx="1"/>
+          </p:nvPr>
+        </p:nvSpPr>
+        <p:spPr>
+          <a:xfrm>
+            <a:off x="3884613" y="0"/>
+            <a:ext cx="2971800" cy="458788"/>
+          </a:xfrm>
+          <a:prstGeom prst="rect">
+            <a:avLst/>
+          </a:prstGeom>
+        </p:spPr>
+        <p:txBody>
+          <a:bodyPr vert="horz" lIns="91440" tIns="45720" rIns="91440" bIns="45720" rtlCol="0"/>
+          <a:lstStyle>
+            <a:lvl1pPr algn="r">
+              <a:defRPr sz="1200"/>
+            </a:lvl1pPr>
+          </a:lstStyle>
+          <a:p>
+            <a:fld id="{42F3D158-BD39-44E3-8BA8-DB88535CA5CA}" type="datetimeFigureOut">
+              <a:rPr lang="en-US" smtClean="0"/>
+              <a:t>2/21/2021</a:t>
+            </a:fld>
+            <a:endParaRPr lang="en-US"/>
+          </a:p>
+        </p:txBody>
+      </p:sp>
+      <p:sp>
+        <p:nvSpPr>
+          <p:cNvPr id="4" name="Slide Image Placeholder 3"/>
+          <p:cNvSpPr>
+            <a:spLocks noGrp="1" noRot="1" noChangeAspect="1"/>
+          </p:cNvSpPr>
+          <p:nvPr>
+            <p:ph type="sldImg" idx="2"/>
+          </p:nvPr>
+        </p:nvSpPr>
+        <p:spPr>
+          <a:xfrm>
+            <a:off x="685800" y="1143000"/>
+            <a:ext cx="5486400" cy="3086100"/>
+          </a:xfrm>
+          <a:prstGeom prst="rect">
+            <a:avLst/>
+          </a:prstGeom>
+          <a:noFill/>
+          <a:ln w="12700">
+            <a:solidFill>
+              <a:prstClr val="black"/>
+            </a:solidFill>
+          </a:ln>
+        </p:spPr>
+        <p:txBody>
+          <a:bodyPr vert="horz" lIns="91440" tIns="45720" rIns="91440" bIns="45720" rtlCol="0" anchor="ctr"/>
+          <a:lstStyle/>
+          <a:p>
+            <a:endParaRPr lang="en-US"/>
+          </a:p>
+        </p:txBody>
+      </p:sp>
+      <p:sp>
+        <p:nvSpPr>
+          <p:cNvPr id="5" name="Notes Placeholder 4"/>
+          <p:cNvSpPr>
+            <a:spLocks noGrp="1"/>
+          </p:cNvSpPr>
+          <p:nvPr>
+            <p:ph type="body" sz="quarter" idx="3"/>
+          </p:nvPr>
+        </p:nvSpPr>
+        <p:spPr>
+          <a:xfrm>
+            <a:off x="685800" y="4400550"/>
+            <a:ext cx="5486400" cy="3600450"/>
+          </a:xfrm>
+          <a:prstGeom prst="rect">
+            <a:avLst/>
+          </a:prstGeom>
+        </p:spPr>
+        <p:txBody>
+          <a:bodyPr vert="horz" lIns="91440" tIns="45720" rIns="91440" bIns="45720" rtlCol="0"/>
+          <a:lstStyle/>
+          <a:p>
+            <a:pPr lvl="0"/>
+            <a:r>
+              <a:rPr lang="en-US"/>
+              <a:t>Click to edit Master text styles</a:t>
+            </a:r>
+          </a:p>
+          <a:p>
+            <a:pPr lvl="1"/>
+            <a:r>
+              <a:rPr lang="en-US"/>
+              <a:t>Second level</a:t>
+            </a:r>
+          </a:p>
+          <a:p>
+            <a:pPr lvl="2"/>
+            <a:r>
+              <a:rPr lang="en-US"/>
+              <a:t>Third level</a:t>
+            </a:r>
+          </a:p>
+          <a:p>
+            <a:pPr lvl="3"/>
+            <a:r>
+              <a:rPr lang="en-US"/>
+              <a:t>Fourth level</a:t>
+            </a:r>
+          </a:p>
+          <a:p>
+            <a:pPr lvl="4"/>
+            <a:r>
+              <a:rPr lang="en-US"/>
+              <a:t>Fifth level</a:t>
+            </a:r>
+          </a:p>
+        </p:txBody>
+      </p:sp>
+      <p:sp>
+        <p:nvSpPr>
+          <p:cNvPr id="6" name="Footer Placeholder 5"/>
+          <p:cNvSpPr>
+            <a:spLocks noGrp="1"/>
+          </p:cNvSpPr>
+          <p:nvPr>
+            <p:ph type="ftr" sz="quarter" idx="4"/>
+          </p:nvPr>
+        </p:nvSpPr>
+        <p:spPr>
+          <a:xfrm>
+            <a:off x="0" y="8685213"/>
+            <a:ext cx="2971800" cy="458787"/>
+          </a:xfrm>
+          <a:prstGeom prst="rect">
+            <a:avLst/>
+          </a:prstGeom>
+        </p:spPr>
+        <p:txBody>
+          <a:bodyPr vert="horz" lIns="91440" tIns="45720" rIns="91440" bIns="45720" rtlCol="0" anchor="b"/>
+          <a:lstStyle>
+            <a:lvl1pPr algn="l">
+              <a:defRPr sz="1200"/>
+            </a:lvl1pPr>
+          </a:lstStyle>
+          <a:p>
+            <a:endParaRPr lang="en-US"/>
+          </a:p>
+        </p:txBody>
+      </p:sp>
+      <p:sp>
+        <p:nvSpPr>
+          <p:cNvPr id="7" name="Slide Number Placeholder 6"/>
+          <p:cNvSpPr>
+            <a:spLocks noGrp="1"/>
+          </p:cNvSpPr>
+          <p:nvPr>
+            <p:ph type="sldNum" sz="quarter" idx="5"/>
+          </p:nvPr>
+        </p:nvSpPr>
+        <p:spPr>
+          <a:xfrm>
+            <a:off x="3884613" y="8685213"/>
+            <a:ext cx="2971800" cy="458787"/>
+          </a:xfrm>
+          <a:prstGeom prst="rect">
+            <a:avLst/>
+          </a:prstGeom>
+        </p:spPr>
+        <p:txBody>
+          <a:bodyPr vert="horz" lIns="91440" tIns="45720" rIns="91440" bIns="45720" rtlCol="0" anchor="b"/>
+          <a:lstStyle>
+            <a:lvl1pPr algn="r">
+              <a:defRPr sz="1200"/>
+            </a:lvl1pPr>
+          </a:lstStyle>
+          <a:p>
+            <a:fld id="{51BAA0DF-8DC0-4333-AA56-DD2F9378AE81}" type="slidenum">
+              <a:rPr lang="en-US" smtClean="0"/>
+              <a:t>‹#›</a:t>
+            </a:fld>
+            <a:endParaRPr lang="en-US"/>
+          </a:p>
+        </p:txBody>
+      </p:sp>
+    </p:spTree>
+    <p:extLst>
+      <p:ext uri="{BB962C8B-B14F-4D97-AF65-F5344CB8AC3E}">
+        <p14:creationId xmlns:p14="http://schemas.microsoft.com/office/powerpoint/2010/main" val="3390271442"/>
+      </p:ext>
+    </p:extLst>
+  </p:cSld>
+  <p:clrMap bg1="lt1" tx1="dk1" bg2="lt2" tx2="dk2" accent1="accent1" accent2="accent2" accent3="accent3" accent4="accent4" accent5="accent5" accent6="accent6" hlink="hlink" folHlink="folHlink"/>
+  <p:notesStyle>
+    <a:lvl1pPr marL="0" algn="l" defTabSz="914400" rtl="0" eaLnBrk="1" latinLnBrk="0" hangingPunct="1">
+      <a:defRPr sz="1200" kern="1200">
+        <a:solidFill>
+          <a:schemeClr val="tx1"/>
+        </a:solidFill>
+        <a:latin typeface="+mn-lt"/>
+        <a:ea typeface="+mn-ea"/>
+        <a:cs typeface="+mn-cs"/>
+      </a:defRPr>
+    </a:lvl1pPr>
+    <a:lvl2pPr marL="457200" algn="l" defTabSz="914400" rtl="0" eaLnBrk="1" latinLnBrk="0" hangingPunct="1">
+      <a:defRPr sz="1200" kern="1200">
+        <a:solidFill>
+          <a:schemeClr val="tx1"/>
+        </a:solidFill>
+        <a:latin typeface="+mn-lt"/>
+        <a:ea typeface="+mn-ea"/>
+        <a:cs typeface="+mn-cs"/>
+      </a:defRPr>
+    </a:lvl2pPr>
+    <a:lvl3pPr marL="914400" algn="l" defTabSz="914400" rtl="0" eaLnBrk="1" latinLnBrk="0" hangingPunct="1">
+      <a:defRPr sz="1200" kern="1200">
+        <a:solidFill>
+          <a:schemeClr val="tx1"/>
+        </a:solidFill>
+        <a:latin typeface="+mn-lt"/>
+        <a:ea typeface="+mn-ea"/>
+        <a:cs typeface="+mn-cs"/>
+      </a:defRPr>
+    </a:lvl3pPr>
+    <a:lvl4pPr marL="1371600" algn="l" defTabSz="914400" rtl="0" eaLnBrk="1" latinLnBrk="0" hangingPunct="1">
+      <a:defRPr sz="1200" kern="1200">
+        <a:solidFill>
+          <a:schemeClr val="tx1"/>
+        </a:solidFill>
+        <a:latin typeface="+mn-lt"/>
+        <a:ea typeface="+mn-ea"/>
+        <a:cs typeface="+mn-cs"/>
+      </a:defRPr>
+    </a:lvl4pPr>
+    <a:lvl5pPr marL="1828800" algn="l" defTabSz="914400" rtl="0" eaLnBrk="1" latinLnBrk="0" hangingPunct="1">
+      <a:defRPr sz="1200" kern="1200">
+        <a:solidFill>
+          <a:schemeClr val="tx1"/>
+        </a:solidFill>
+        <a:latin typeface="+mn-lt"/>
+        <a:ea typeface="+mn-ea"/>
+        <a:cs typeface="+mn-cs"/>
+      </a:defRPr>
+    </a:lvl5pPr>
+    <a:lvl6pPr marL="2286000" algn="l" defTabSz="914400" rtl="0" eaLnBrk="1" latinLnBrk="0" hangingPunct="1">
+      <a:defRPr sz="1200" kern="1200">
+        <a:solidFill>
+          <a:schemeClr val="tx1"/>
+        </a:solidFill>
+        <a:latin typeface="+mn-lt"/>
+        <a:ea typeface="+mn-ea"/>
+        <a:cs typeface="+mn-cs"/>
+      </a:defRPr>
+    </a:lvl6pPr>
+    <a:lvl7pPr marL="2743200" algn="l" defTabSz="914400" rtl="0" eaLnBrk="1" latinLnBrk="0" hangingPunct="1">
+      <a:defRPr sz="1200" kern="1200">
+        <a:solidFill>
+          <a:schemeClr val="tx1"/>
+        </a:solidFill>
+        <a:latin typeface="+mn-lt"/>
+        <a:ea typeface="+mn-ea"/>
+        <a:cs typeface="+mn-cs"/>
+      </a:defRPr>
+    </a:lvl7pPr>
+    <a:lvl8pPr marL="3200400" algn="l" defTabSz="914400" rtl="0" eaLnBrk="1" latinLnBrk="0" hangingPunct="1">
+      <a:defRPr sz="1200" kern="1200">
+        <a:solidFill>
+          <a:schemeClr val="tx1"/>
+        </a:solidFill>
+        <a:latin typeface="+mn-lt"/>
+        <a:ea typeface="+mn-ea"/>
+        <a:cs typeface="+mn-cs"/>
+      </a:defRPr>
+    </a:lvl8pPr>
+    <a:lvl9pPr marL="3657600" algn="l" defTabSz="914400" rtl="0" eaLnBrk="1" latinLnBrk="0" hangingPunct="1">
+      <a:defRPr sz="1200" kern="1200">
+        <a:solidFill>
+          <a:schemeClr val="tx1"/>
+        </a:solidFill>
+        <a:latin typeface="+mn-lt"/>
+        <a:ea typeface="+mn-ea"/>
+        <a:cs typeface="+mn-cs"/>
+      </a:defRPr>
+    </a:lvl9pPr>
+  </p:notesStyle>
+</p:notesMaster>
+</file>
+
 <file path=ppt/slideLayouts/slideLayout1.xml><?xml version="1.0" encoding="utf-8"?>
 <p:sldLayout xmlns:a="http://schemas.openxmlformats.org/drawingml/2006/main" xmlns:r="http://schemas.openxmlformats.org/officeDocument/2006/relationships" xmlns:p="http://schemas.openxmlformats.org/presentationml/2006/main" type="title" preserve="1">
   <p:cSld name="Title Slide">
@@ -260,7 +617,7 @@
           <a:p>
             <a:fld id="{62EC7320-38BF-4449-BE1F-EC165202E8B9}" type="datetimeFigureOut">
               <a:rPr lang="en-US" smtClean="0"/>
-              <a:t>2/20/2021</a:t>
+              <a:t>2/21/2021</a:t>
             </a:fld>
             <a:endParaRPr lang="en-US"/>
           </a:p>
@@ -458,7 +815,7 @@
           <a:p>
             <a:fld id="{62EC7320-38BF-4449-BE1F-EC165202E8B9}" type="datetimeFigureOut">
               <a:rPr lang="en-US" smtClean="0"/>
-              <a:t>2/20/2021</a:t>
+              <a:t>2/21/2021</a:t>
             </a:fld>
             <a:endParaRPr lang="en-US"/>
           </a:p>
@@ -666,7 +1023,7 @@
           <a:p>
             <a:fld id="{62EC7320-38BF-4449-BE1F-EC165202E8B9}" type="datetimeFigureOut">
               <a:rPr lang="en-US" smtClean="0"/>
-              <a:t>2/20/2021</a:t>
+              <a:t>2/21/2021</a:t>
             </a:fld>
             <a:endParaRPr lang="en-US"/>
           </a:p>
@@ -864,7 +1221,7 @@
           <a:p>
             <a:fld id="{62EC7320-38BF-4449-BE1F-EC165202E8B9}" type="datetimeFigureOut">
               <a:rPr lang="en-US" smtClean="0"/>
-              <a:t>2/20/2021</a:t>
+              <a:t>2/21/2021</a:t>
             </a:fld>
             <a:endParaRPr lang="en-US"/>
           </a:p>
@@ -1139,7 +1496,7 @@
           <a:p>
             <a:fld id="{62EC7320-38BF-4449-BE1F-EC165202E8B9}" type="datetimeFigureOut">
               <a:rPr lang="en-US" smtClean="0"/>
-              <a:t>2/20/2021</a:t>
+              <a:t>2/21/2021</a:t>
             </a:fld>
             <a:endParaRPr lang="en-US"/>
           </a:p>
@@ -1404,7 +1761,7 @@
           <a:p>
             <a:fld id="{62EC7320-38BF-4449-BE1F-EC165202E8B9}" type="datetimeFigureOut">
               <a:rPr lang="en-US" smtClean="0"/>
-              <a:t>2/20/2021</a:t>
+              <a:t>2/21/2021</a:t>
             </a:fld>
             <a:endParaRPr lang="en-US"/>
           </a:p>
@@ -1816,7 +2173,7 @@
           <a:p>
             <a:fld id="{62EC7320-38BF-4449-BE1F-EC165202E8B9}" type="datetimeFigureOut">
               <a:rPr lang="en-US" smtClean="0"/>
-              <a:t>2/20/2021</a:t>
+              <a:t>2/21/2021</a:t>
             </a:fld>
             <a:endParaRPr lang="en-US"/>
           </a:p>
@@ -1957,7 +2314,7 @@
           <a:p>
             <a:fld id="{62EC7320-38BF-4449-BE1F-EC165202E8B9}" type="datetimeFigureOut">
               <a:rPr lang="en-US" smtClean="0"/>
-              <a:t>2/20/2021</a:t>
+              <a:t>2/21/2021</a:t>
             </a:fld>
             <a:endParaRPr lang="en-US"/>
           </a:p>
@@ -2070,7 +2427,7 @@
           <a:p>
             <a:fld id="{62EC7320-38BF-4449-BE1F-EC165202E8B9}" type="datetimeFigureOut">
               <a:rPr lang="en-US" smtClean="0"/>
-              <a:t>2/20/2021</a:t>
+              <a:t>2/21/2021</a:t>
             </a:fld>
             <a:endParaRPr lang="en-US"/>
           </a:p>
@@ -2381,7 +2738,7 @@
           <a:p>
             <a:fld id="{62EC7320-38BF-4449-BE1F-EC165202E8B9}" type="datetimeFigureOut">
               <a:rPr lang="en-US" smtClean="0"/>
-              <a:t>2/20/2021</a:t>
+              <a:t>2/21/2021</a:t>
             </a:fld>
             <a:endParaRPr lang="en-US"/>
           </a:p>
@@ -2669,7 +3026,7 @@
           <a:p>
             <a:fld id="{62EC7320-38BF-4449-BE1F-EC165202E8B9}" type="datetimeFigureOut">
               <a:rPr lang="en-US" smtClean="0"/>
-              <a:t>2/20/2021</a:t>
+              <a:t>2/21/2021</a:t>
             </a:fld>
             <a:endParaRPr lang="en-US"/>
           </a:p>
@@ -2910,7 +3267,7 @@
           <a:p>
             <a:fld id="{62EC7320-38BF-4449-BE1F-EC165202E8B9}" type="datetimeFigureOut">
               <a:rPr lang="en-US" smtClean="0"/>
-              <a:t>2/20/2021</a:t>
+              <a:t>2/21/2021</a:t>
             </a:fld>
             <a:endParaRPr lang="en-US"/>
           </a:p>
@@ -3350,7 +3707,7 @@
           <a:p>
             <a:r>
               <a:rPr lang="en-US" dirty="0"/>
-              <a:t>What next?</a:t>
+              <a:t>Now, what next?</a:t>
             </a:r>
           </a:p>
         </p:txBody>
@@ -3378,7 +3735,7 @@
           <a:p>
             <a:r>
               <a:rPr lang="en-US" dirty="0"/>
-              <a:t>Emerging Technologies and some suggestions …</a:t>
+              <a:t>Yogesh Kulkarni</a:t>
             </a:r>
           </a:p>
         </p:txBody>
@@ -3562,6 +3919,479 @@
     <p:extLst>
       <p:ext uri="{BB962C8B-B14F-4D97-AF65-F5344CB8AC3E}">
         <p14:creationId xmlns:p14="http://schemas.microsoft.com/office/powerpoint/2010/main" val="1739440550"/>
+      </p:ext>
+    </p:extLst>
+  </p:cSld>
+  <p:clrMapOvr>
+    <a:masterClrMapping/>
+  </p:clrMapOvr>
+</p:sld>
+</file>
+
+<file path=ppt/slides/slide3.xml><?xml version="1.0" encoding="utf-8"?>
+<p:sld xmlns:a="http://schemas.openxmlformats.org/drawingml/2006/main" xmlns:r="http://schemas.openxmlformats.org/officeDocument/2006/relationships" xmlns:p="http://schemas.openxmlformats.org/presentationml/2006/main">
+  <p:cSld>
+    <p:spTree>
+      <p:nvGrpSpPr>
+        <p:cNvPr id="1" name=""/>
+        <p:cNvGrpSpPr/>
+        <p:nvPr/>
+      </p:nvGrpSpPr>
+      <p:grpSpPr>
+        <a:xfrm>
+          <a:off x="0" y="0"/>
+          <a:ext cx="0" cy="0"/>
+          <a:chOff x="0" y="0"/>
+          <a:chExt cx="0" cy="0"/>
+        </a:xfrm>
+      </p:grpSpPr>
+      <p:sp>
+        <p:nvSpPr>
+          <p:cNvPr id="2" name="Title 1">
+            <a:extLst>
+              <a:ext uri="{FF2B5EF4-FFF2-40B4-BE49-F238E27FC236}">
+                <a16:creationId xmlns:a16="http://schemas.microsoft.com/office/drawing/2014/main" id="{372DEC65-7CF9-40B7-935E-82D100C8C5B4}"/>
+              </a:ext>
+            </a:extLst>
+          </p:cNvPr>
+          <p:cNvSpPr>
+            <a:spLocks noGrp="1"/>
+          </p:cNvSpPr>
+          <p:nvPr>
+            <p:ph type="title"/>
+          </p:nvPr>
+        </p:nvSpPr>
+        <p:spPr/>
+        <p:txBody>
+          <a:bodyPr/>
+          <a:lstStyle/>
+          <a:p>
+            <a:r>
+              <a:rPr lang="en-US" dirty="0"/>
+              <a:t>What got you here,</a:t>
+            </a:r>
+            <a:br>
+              <a:rPr lang="en-US" dirty="0"/>
+            </a:br>
+            <a:r>
+              <a:rPr lang="en-US" dirty="0"/>
+              <a:t>Won’t get you there!!</a:t>
+            </a:r>
+          </a:p>
+        </p:txBody>
+      </p:sp>
+      <p:sp>
+        <p:nvSpPr>
+          <p:cNvPr id="3" name="Text Placeholder 2">
+            <a:extLst>
+              <a:ext uri="{FF2B5EF4-FFF2-40B4-BE49-F238E27FC236}">
+                <a16:creationId xmlns:a16="http://schemas.microsoft.com/office/drawing/2014/main" id="{595B51CB-FD5E-484E-8424-C0A9C9991742}"/>
+              </a:ext>
+            </a:extLst>
+          </p:cNvPr>
+          <p:cNvSpPr>
+            <a:spLocks noGrp="1"/>
+          </p:cNvSpPr>
+          <p:nvPr>
+            <p:ph type="body" idx="1"/>
+          </p:nvPr>
+        </p:nvSpPr>
+        <p:spPr/>
+        <p:txBody>
+          <a:bodyPr/>
+          <a:lstStyle/>
+          <a:p>
+            <a:r>
+              <a:rPr lang="en-US" dirty="0"/>
+              <a:t>- Marshall Goldsmith</a:t>
+            </a:r>
+          </a:p>
+        </p:txBody>
+      </p:sp>
+    </p:spTree>
+    <p:extLst>
+      <p:ext uri="{BB962C8B-B14F-4D97-AF65-F5344CB8AC3E}">
+        <p14:creationId xmlns:p14="http://schemas.microsoft.com/office/powerpoint/2010/main" val="2786094835"/>
+      </p:ext>
+    </p:extLst>
+  </p:cSld>
+  <p:clrMapOvr>
+    <a:masterClrMapping/>
+  </p:clrMapOvr>
+</p:sld>
+</file>
+
+<file path=ppt/slides/slide4.xml><?xml version="1.0" encoding="utf-8"?>
+<p:sld xmlns:a="http://schemas.openxmlformats.org/drawingml/2006/main" xmlns:r="http://schemas.openxmlformats.org/officeDocument/2006/relationships" xmlns:p="http://schemas.openxmlformats.org/presentationml/2006/main">
+  <p:cSld>
+    <p:spTree>
+      <p:nvGrpSpPr>
+        <p:cNvPr id="1" name=""/>
+        <p:cNvGrpSpPr/>
+        <p:nvPr/>
+      </p:nvGrpSpPr>
+      <p:grpSpPr>
+        <a:xfrm>
+          <a:off x="0" y="0"/>
+          <a:ext cx="0" cy="0"/>
+          <a:chOff x="0" y="0"/>
+          <a:chExt cx="0" cy="0"/>
+        </a:xfrm>
+      </p:grpSpPr>
+      <p:sp>
+        <p:nvSpPr>
+          <p:cNvPr id="2" name="Title 1">
+            <a:extLst>
+              <a:ext uri="{FF2B5EF4-FFF2-40B4-BE49-F238E27FC236}">
+                <a16:creationId xmlns:a16="http://schemas.microsoft.com/office/drawing/2014/main" id="{63D40543-BC75-4773-AF53-D5276182D25E}"/>
+              </a:ext>
+            </a:extLst>
+          </p:cNvPr>
+          <p:cNvSpPr>
+            <a:spLocks noGrp="1"/>
+          </p:cNvSpPr>
+          <p:nvPr>
+            <p:ph type="title"/>
+          </p:nvPr>
+        </p:nvSpPr>
+        <p:spPr/>
+        <p:txBody>
+          <a:bodyPr/>
+          <a:lstStyle/>
+          <a:p>
+            <a:r>
+              <a:rPr lang="en-US" dirty="0"/>
+              <a:t>Agenda*</a:t>
+            </a:r>
+          </a:p>
+        </p:txBody>
+      </p:sp>
+      <p:sp>
+        <p:nvSpPr>
+          <p:cNvPr id="3" name="Content Placeholder 2">
+            <a:extLst>
+              <a:ext uri="{FF2B5EF4-FFF2-40B4-BE49-F238E27FC236}">
+                <a16:creationId xmlns:a16="http://schemas.microsoft.com/office/drawing/2014/main" id="{950ADC3F-103E-494F-AC14-A9CD23DA1717}"/>
+              </a:ext>
+            </a:extLst>
+          </p:cNvPr>
+          <p:cNvSpPr>
+            <a:spLocks noGrp="1"/>
+          </p:cNvSpPr>
+          <p:nvPr>
+            <p:ph idx="1"/>
+          </p:nvPr>
+        </p:nvSpPr>
+        <p:spPr/>
+        <p:txBody>
+          <a:bodyPr>
+            <a:normAutofit/>
+          </a:bodyPr>
+          <a:lstStyle/>
+          <a:p>
+            <a:pPr marL="514350" indent="-514350">
+              <a:buFont typeface="+mj-lt"/>
+              <a:buAutoNum type="arabicPeriod"/>
+            </a:pPr>
+            <a:r>
+              <a:rPr lang="en-US" dirty="0"/>
+              <a:t>Emerging Technologies</a:t>
+            </a:r>
+          </a:p>
+          <a:p>
+            <a:pPr marL="514350" indent="-514350">
+              <a:buFont typeface="+mj-lt"/>
+              <a:buAutoNum type="arabicPeriod"/>
+            </a:pPr>
+            <a:r>
+              <a:rPr lang="en-US" dirty="0"/>
+              <a:t>How to prepare?</a:t>
+            </a:r>
+          </a:p>
+          <a:p>
+            <a:pPr marL="0" indent="0">
+              <a:buNone/>
+            </a:pPr>
+            <a:endParaRPr lang="en-US" dirty="0"/>
+          </a:p>
+        </p:txBody>
+      </p:sp>
+    </p:spTree>
+    <p:extLst>
+      <p:ext uri="{BB962C8B-B14F-4D97-AF65-F5344CB8AC3E}">
+        <p14:creationId xmlns:p14="http://schemas.microsoft.com/office/powerpoint/2010/main" val="366006817"/>
+      </p:ext>
+    </p:extLst>
+  </p:cSld>
+  <p:clrMapOvr>
+    <a:masterClrMapping/>
+  </p:clrMapOvr>
+</p:sld>
+</file>
+
+<file path=ppt/slides/slide5.xml><?xml version="1.0" encoding="utf-8"?>
+<p:sld xmlns:a="http://schemas.openxmlformats.org/drawingml/2006/main" xmlns:r="http://schemas.openxmlformats.org/officeDocument/2006/relationships" xmlns:p="http://schemas.openxmlformats.org/presentationml/2006/main">
+  <p:cSld>
+    <p:spTree>
+      <p:nvGrpSpPr>
+        <p:cNvPr id="1" name=""/>
+        <p:cNvGrpSpPr/>
+        <p:nvPr/>
+      </p:nvGrpSpPr>
+      <p:grpSpPr>
+        <a:xfrm>
+          <a:off x="0" y="0"/>
+          <a:ext cx="0" cy="0"/>
+          <a:chOff x="0" y="0"/>
+          <a:chExt cx="0" cy="0"/>
+        </a:xfrm>
+      </p:grpSpPr>
+      <p:sp>
+        <p:nvSpPr>
+          <p:cNvPr id="2" name="Title 1">
+            <a:extLst>
+              <a:ext uri="{FF2B5EF4-FFF2-40B4-BE49-F238E27FC236}">
+                <a16:creationId xmlns:a16="http://schemas.microsoft.com/office/drawing/2014/main" id="{63D40543-BC75-4773-AF53-D5276182D25E}"/>
+              </a:ext>
+            </a:extLst>
+          </p:cNvPr>
+          <p:cNvSpPr>
+            <a:spLocks noGrp="1"/>
+          </p:cNvSpPr>
+          <p:nvPr>
+            <p:ph type="title"/>
+          </p:nvPr>
+        </p:nvSpPr>
+        <p:spPr/>
+        <p:txBody>
+          <a:bodyPr/>
+          <a:lstStyle/>
+          <a:p>
+            <a:r>
+              <a:rPr lang="en-US" dirty="0"/>
+              <a:t>*Disclaimer</a:t>
+            </a:r>
+          </a:p>
+        </p:txBody>
+      </p:sp>
+      <p:sp>
+        <p:nvSpPr>
+          <p:cNvPr id="3" name="Content Placeholder 2">
+            <a:extLst>
+              <a:ext uri="{FF2B5EF4-FFF2-40B4-BE49-F238E27FC236}">
+                <a16:creationId xmlns:a16="http://schemas.microsoft.com/office/drawing/2014/main" id="{950ADC3F-103E-494F-AC14-A9CD23DA1717}"/>
+              </a:ext>
+            </a:extLst>
+          </p:cNvPr>
+          <p:cNvSpPr>
+            <a:spLocks noGrp="1"/>
+          </p:cNvSpPr>
+          <p:nvPr>
+            <p:ph idx="1"/>
+          </p:nvPr>
+        </p:nvSpPr>
+        <p:spPr/>
+        <p:txBody>
+          <a:bodyPr>
+            <a:normAutofit/>
+          </a:bodyPr>
+          <a:lstStyle/>
+          <a:p>
+            <a:r>
+              <a:rPr lang="en-US" sz="2400" dirty="0"/>
+              <a:t>No one knows about the future. That’s it. </a:t>
+            </a:r>
+          </a:p>
+          <a:p>
+            <a:r>
+              <a:rPr lang="en-US" sz="2400" dirty="0"/>
+              <a:t>We can just speculate and prepare accordingly. </a:t>
+            </a:r>
+          </a:p>
+          <a:p>
+            <a:r>
+              <a:rPr lang="en-US" sz="2400" dirty="0"/>
+              <a:t>Accept the content, only if you like. Be your own judge.</a:t>
+            </a:r>
+          </a:p>
+        </p:txBody>
+      </p:sp>
+    </p:spTree>
+    <p:extLst>
+      <p:ext uri="{BB962C8B-B14F-4D97-AF65-F5344CB8AC3E}">
+        <p14:creationId xmlns:p14="http://schemas.microsoft.com/office/powerpoint/2010/main" val="979304728"/>
+      </p:ext>
+    </p:extLst>
+  </p:cSld>
+  <p:clrMapOvr>
+    <a:masterClrMapping/>
+  </p:clrMapOvr>
+</p:sld>
+</file>
+
+<file path=ppt/slides/slide6.xml><?xml version="1.0" encoding="utf-8"?>
+<p:sld xmlns:a="http://schemas.openxmlformats.org/drawingml/2006/main" xmlns:r="http://schemas.openxmlformats.org/officeDocument/2006/relationships" xmlns:p="http://schemas.openxmlformats.org/presentationml/2006/main">
+  <p:cSld>
+    <p:spTree>
+      <p:nvGrpSpPr>
+        <p:cNvPr id="1" name=""/>
+        <p:cNvGrpSpPr/>
+        <p:nvPr/>
+      </p:nvGrpSpPr>
+      <p:grpSpPr>
+        <a:xfrm>
+          <a:off x="0" y="0"/>
+          <a:ext cx="0" cy="0"/>
+          <a:chOff x="0" y="0"/>
+          <a:chExt cx="0" cy="0"/>
+        </a:xfrm>
+      </p:grpSpPr>
+      <p:sp>
+        <p:nvSpPr>
+          <p:cNvPr id="2" name="Title 1">
+            <a:extLst>
+              <a:ext uri="{FF2B5EF4-FFF2-40B4-BE49-F238E27FC236}">
+                <a16:creationId xmlns:a16="http://schemas.microsoft.com/office/drawing/2014/main" id="{E91125B2-D183-499C-9CD5-ECE0ECD5039E}"/>
+              </a:ext>
+            </a:extLst>
+          </p:cNvPr>
+          <p:cNvSpPr>
+            <a:spLocks noGrp="1"/>
+          </p:cNvSpPr>
+          <p:nvPr>
+            <p:ph type="title"/>
+          </p:nvPr>
+        </p:nvSpPr>
+        <p:spPr/>
+        <p:txBody>
+          <a:bodyPr/>
+          <a:lstStyle/>
+          <a:p>
+            <a:r>
+              <a:rPr lang="en-US" dirty="0"/>
+              <a:t>Emerging Technologies</a:t>
+            </a:r>
+          </a:p>
+        </p:txBody>
+      </p:sp>
+      <p:sp>
+        <p:nvSpPr>
+          <p:cNvPr id="3" name="Text Placeholder 2">
+            <a:extLst>
+              <a:ext uri="{FF2B5EF4-FFF2-40B4-BE49-F238E27FC236}">
+                <a16:creationId xmlns:a16="http://schemas.microsoft.com/office/drawing/2014/main" id="{329E6170-18A0-4B11-8AA7-49091AC80AC9}"/>
+              </a:ext>
+            </a:extLst>
+          </p:cNvPr>
+          <p:cNvSpPr>
+            <a:spLocks noGrp="1"/>
+          </p:cNvSpPr>
+          <p:nvPr>
+            <p:ph type="body" idx="1"/>
+          </p:nvPr>
+        </p:nvSpPr>
+        <p:spPr/>
+        <p:txBody>
+          <a:bodyPr/>
+          <a:lstStyle/>
+          <a:p>
+            <a:r>
+              <a:rPr lang="en-US" dirty="0"/>
+              <a:t>The Hype cycles</a:t>
+            </a:r>
+          </a:p>
+        </p:txBody>
+      </p:sp>
+    </p:spTree>
+    <p:extLst>
+      <p:ext uri="{BB962C8B-B14F-4D97-AF65-F5344CB8AC3E}">
+        <p14:creationId xmlns:p14="http://schemas.microsoft.com/office/powerpoint/2010/main" val="2970192805"/>
+      </p:ext>
+    </p:extLst>
+  </p:cSld>
+  <p:clrMapOvr>
+    <a:masterClrMapping/>
+  </p:clrMapOvr>
+</p:sld>
+</file>
+
+<file path=ppt/slides/slide7.xml><?xml version="1.0" encoding="utf-8"?>
+<p:sld xmlns:a="http://schemas.openxmlformats.org/drawingml/2006/main" xmlns:r="http://schemas.openxmlformats.org/officeDocument/2006/relationships" xmlns:p="http://schemas.openxmlformats.org/presentationml/2006/main">
+  <p:cSld>
+    <p:spTree>
+      <p:nvGrpSpPr>
+        <p:cNvPr id="1" name=""/>
+        <p:cNvGrpSpPr/>
+        <p:nvPr/>
+      </p:nvGrpSpPr>
+      <p:grpSpPr>
+        <a:xfrm>
+          <a:off x="0" y="0"/>
+          <a:ext cx="0" cy="0"/>
+          <a:chOff x="0" y="0"/>
+          <a:chExt cx="0" cy="0"/>
+        </a:xfrm>
+      </p:grpSpPr>
+      <p:sp>
+        <p:nvSpPr>
+          <p:cNvPr id="2" name="Title 1">
+            <a:extLst>
+              <a:ext uri="{FF2B5EF4-FFF2-40B4-BE49-F238E27FC236}">
+                <a16:creationId xmlns:a16="http://schemas.microsoft.com/office/drawing/2014/main" id="{E91125B2-D183-499C-9CD5-ECE0ECD5039E}"/>
+              </a:ext>
+            </a:extLst>
+          </p:cNvPr>
+          <p:cNvSpPr>
+            <a:spLocks noGrp="1"/>
+          </p:cNvSpPr>
+          <p:nvPr>
+            <p:ph type="title"/>
+          </p:nvPr>
+        </p:nvSpPr>
+        <p:spPr/>
+        <p:txBody>
+          <a:bodyPr/>
+          <a:lstStyle/>
+          <a:p>
+            <a:r>
+              <a:rPr lang="en-US" dirty="0"/>
+              <a:t>How to prepare?</a:t>
+            </a:r>
+          </a:p>
+        </p:txBody>
+      </p:sp>
+      <p:sp>
+        <p:nvSpPr>
+          <p:cNvPr id="3" name="Text Placeholder 2">
+            <a:extLst>
+              <a:ext uri="{FF2B5EF4-FFF2-40B4-BE49-F238E27FC236}">
+                <a16:creationId xmlns:a16="http://schemas.microsoft.com/office/drawing/2014/main" id="{329E6170-18A0-4B11-8AA7-49091AC80AC9}"/>
+              </a:ext>
+            </a:extLst>
+          </p:cNvPr>
+          <p:cNvSpPr>
+            <a:spLocks noGrp="1"/>
+          </p:cNvSpPr>
+          <p:nvPr>
+            <p:ph type="body" idx="1"/>
+          </p:nvPr>
+        </p:nvSpPr>
+        <p:spPr/>
+        <p:txBody>
+          <a:bodyPr/>
+          <a:lstStyle/>
+          <a:p>
+            <a:r>
+              <a:rPr lang="en-US" dirty="0"/>
+              <a:t>Unsolicited advice</a:t>
+            </a:r>
+          </a:p>
+        </p:txBody>
+      </p:sp>
+    </p:spTree>
+    <p:extLst>
+      <p:ext uri="{BB962C8B-B14F-4D97-AF65-F5344CB8AC3E}">
+        <p14:creationId xmlns:p14="http://schemas.microsoft.com/office/powerpoint/2010/main" val="4145029003"/>
       </p:ext>
     </p:extLst>
   </p:cSld>
@@ -3864,4 +4694,299 @@
     </a:ext>
   </a:extLst>
 </a:theme>
+</file>
+
+<file path=ppt/theme/theme2.xml><?xml version="1.0" encoding="utf-8"?>
+<a:theme xmlns:a="http://schemas.openxmlformats.org/drawingml/2006/main" name="Office Theme">
+  <a:themeElements>
+    <a:clrScheme name="Office">
+      <a:dk1>
+        <a:sysClr val="windowText" lastClr="000000"/>
+      </a:dk1>
+      <a:lt1>
+        <a:sysClr val="window" lastClr="FFFFFF"/>
+      </a:lt1>
+      <a:dk2>
+        <a:srgbClr val="44546A"/>
+      </a:dk2>
+      <a:lt2>
+        <a:srgbClr val="E7E6E6"/>
+      </a:lt2>
+      <a:accent1>
+        <a:srgbClr val="4472C4"/>
+      </a:accent1>
+      <a:accent2>
+        <a:srgbClr val="ED7D31"/>
+      </a:accent2>
+      <a:accent3>
+        <a:srgbClr val="A5A5A5"/>
+      </a:accent3>
+      <a:accent4>
+        <a:srgbClr val="FFC000"/>
+      </a:accent4>
+      <a:accent5>
+        <a:srgbClr val="5B9BD5"/>
+      </a:accent5>
+      <a:accent6>
+        <a:srgbClr val="70AD47"/>
+      </a:accent6>
+      <a:hlink>
+        <a:srgbClr val="0563C1"/>
+      </a:hlink>
+      <a:folHlink>
+        <a:srgbClr val="954F72"/>
+      </a:folHlink>
+    </a:clrScheme>
+    <a:fontScheme name="Office">
+      <a:majorFont>
+        <a:latin typeface="Calibri Light" panose="020F0302020204030204"/>
+        <a:ea typeface=""/>
+        <a:cs typeface=""/>
+        <a:font script="Jpan" typeface="游ゴシック Light"/>
+        <a:font script="Hang" typeface="맑은 고딕"/>
+        <a:font script="Hans" typeface="等线 Light"/>
+        <a:font script="Hant" typeface="新細明體"/>
+        <a:font script="Arab" typeface="Times New Roman"/>
+        <a:font script="Hebr" typeface="Times New Roman"/>
+        <a:font script="Thai" typeface="Angsana New"/>
+        <a:font script="Ethi" typeface="Nyala"/>
+        <a:font script="Beng" typeface="Vrinda"/>
+        <a:font script="Gujr" typeface="Shruti"/>
+        <a:font script="Khmr" typeface="MoolBoran"/>
+        <a:font script="Knda" typeface="Tunga"/>
+        <a:font script="Guru" typeface="Raavi"/>
+        <a:font script="Cans" typeface="Euphemia"/>
+        <a:font script="Cher" typeface="Plantagenet Cherokee"/>
+        <a:font script="Yiii" typeface="Microsoft Yi Baiti"/>
+        <a:font script="Tibt" typeface="Microsoft Himalaya"/>
+        <a:font script="Thaa" typeface="MV Boli"/>
+        <a:font script="Deva" typeface="Mangal"/>
+        <a:font script="Telu" typeface="Gautami"/>
+        <a:font script="Taml" typeface="Latha"/>
+        <a:font script="Syrc" typeface="Estrangelo Edessa"/>
+        <a:font script="Orya" typeface="Kalinga"/>
+        <a:font script="Mlym" typeface="Kartika"/>
+        <a:font script="Laoo" typeface="DokChampa"/>
+        <a:font script="Sinh" typeface="Iskoola Pota"/>
+        <a:font script="Mong" typeface="Mongolian Baiti"/>
+        <a:font script="Viet" typeface="Times New Roman"/>
+        <a:font script="Uigh" typeface="Microsoft Uighur"/>
+        <a:font script="Geor" typeface="Sylfaen"/>
+        <a:font script="Armn" typeface="Arial"/>
+        <a:font script="Bugi" typeface="Leelawadee UI"/>
+        <a:font script="Bopo" typeface="Microsoft JhengHei"/>
+        <a:font script="Java" typeface="Javanese Text"/>
+        <a:font script="Lisu" typeface="Segoe UI"/>
+        <a:font script="Mymr" typeface="Myanmar Text"/>
+        <a:font script="Nkoo" typeface="Ebrima"/>
+        <a:font script="Olck" typeface="Nirmala UI"/>
+        <a:font script="Osma" typeface="Ebrima"/>
+        <a:font script="Phag" typeface="Phagspa"/>
+        <a:font script="Syrn" typeface="Estrangelo Edessa"/>
+        <a:font script="Syrj" typeface="Estrangelo Edessa"/>
+        <a:font script="Syre" typeface="Estrangelo Edessa"/>
+        <a:font script="Sora" typeface="Nirmala UI"/>
+        <a:font script="Tale" typeface="Microsoft Tai Le"/>
+        <a:font script="Talu" typeface="Microsoft New Tai Lue"/>
+        <a:font script="Tfng" typeface="Ebrima"/>
+      </a:majorFont>
+      <a:minorFont>
+        <a:latin typeface="Calibri" panose="020F0502020204030204"/>
+        <a:ea typeface=""/>
+        <a:cs typeface=""/>
+        <a:font script="Jpan" typeface="游ゴシック"/>
+        <a:font script="Hang" typeface="맑은 고딕"/>
+        <a:font script="Hans" typeface="等线"/>
+        <a:font script="Hant" typeface="新細明體"/>
+        <a:font script="Arab" typeface="Arial"/>
+        <a:font script="Hebr" typeface="Arial"/>
+        <a:font script="Thai" typeface="Cordia New"/>
+        <a:font script="Ethi" typeface="Nyala"/>
+        <a:font script="Beng" typeface="Vrinda"/>
+        <a:font script="Gujr" typeface="Shruti"/>
+        <a:font script="Khmr" typeface="DaunPenh"/>
+        <a:font script="Knda" typeface="Tunga"/>
+        <a:font script="Guru" typeface="Raavi"/>
+        <a:font script="Cans" typeface="Euphemia"/>
+        <a:font script="Cher" typeface="Plantagenet Cherokee"/>
+        <a:font script="Yiii" typeface="Microsoft Yi Baiti"/>
+        <a:font script="Tibt" typeface="Microsoft Himalaya"/>
+        <a:font script="Thaa" typeface="MV Boli"/>
+        <a:font script="Deva" typeface="Mangal"/>
+        <a:font script="Telu" typeface="Gautami"/>
+        <a:font script="Taml" typeface="Latha"/>
+        <a:font script="Syrc" typeface="Estrangelo Edessa"/>
+        <a:font script="Orya" typeface="Kalinga"/>
+        <a:font script="Mlym" typeface="Kartika"/>
+        <a:font script="Laoo" typeface="DokChampa"/>
+        <a:font script="Sinh" typeface="Iskoola Pota"/>
+        <a:font script="Mong" typeface="Mongolian Baiti"/>
+        <a:font script="Viet" typeface="Arial"/>
+        <a:font script="Uigh" typeface="Microsoft Uighur"/>
+        <a:font script="Geor" typeface="Sylfaen"/>
+        <a:font script="Armn" typeface="Arial"/>
+        <a:font script="Bugi" typeface="Leelawadee UI"/>
+        <a:font script="Bopo" typeface="Microsoft JhengHei"/>
+        <a:font script="Java" typeface="Javanese Text"/>
+        <a:font script="Lisu" typeface="Segoe UI"/>
+        <a:font script="Mymr" typeface="Myanmar Text"/>
+        <a:font script="Nkoo" typeface="Ebrima"/>
+        <a:font script="Olck" typeface="Nirmala UI"/>
+        <a:font script="Osma" typeface="Ebrima"/>
+        <a:font script="Phag" typeface="Phagspa"/>
+        <a:font script="Syrn" typeface="Estrangelo Edessa"/>
+        <a:font script="Syrj" typeface="Estrangelo Edessa"/>
+        <a:font script="Syre" typeface="Estrangelo Edessa"/>
+        <a:font script="Sora" typeface="Nirmala UI"/>
+        <a:font script="Tale" typeface="Microsoft Tai Le"/>
+        <a:font script="Talu" typeface="Microsoft New Tai Lue"/>
+        <a:font script="Tfng" typeface="Ebrima"/>
+      </a:minorFont>
+    </a:fontScheme>
+    <a:fmtScheme name="Office">
+      <a:fillStyleLst>
+        <a:solidFill>
+          <a:schemeClr val="phClr"/>
+        </a:solidFill>
+        <a:gradFill rotWithShape="1">
+          <a:gsLst>
+            <a:gs pos="0">
+              <a:schemeClr val="phClr">
+                <a:lumMod val="110000"/>
+                <a:satMod val="105000"/>
+                <a:tint val="67000"/>
+              </a:schemeClr>
+            </a:gs>
+            <a:gs pos="50000">
+              <a:schemeClr val="phClr">
+                <a:lumMod val="105000"/>
+                <a:satMod val="103000"/>
+                <a:tint val="73000"/>
+              </a:schemeClr>
+            </a:gs>
+            <a:gs pos="100000">
+              <a:schemeClr val="phClr">
+                <a:lumMod val="105000"/>
+                <a:satMod val="109000"/>
+                <a:tint val="81000"/>
+              </a:schemeClr>
+            </a:gs>
+          </a:gsLst>
+          <a:lin ang="5400000" scaled="0"/>
+        </a:gradFill>
+        <a:gradFill rotWithShape="1">
+          <a:gsLst>
+            <a:gs pos="0">
+              <a:schemeClr val="phClr">
+                <a:satMod val="103000"/>
+                <a:lumMod val="102000"/>
+                <a:tint val="94000"/>
+              </a:schemeClr>
+            </a:gs>
+            <a:gs pos="50000">
+              <a:schemeClr val="phClr">
+                <a:satMod val="110000"/>
+                <a:lumMod val="100000"/>
+                <a:shade val="100000"/>
+              </a:schemeClr>
+            </a:gs>
+            <a:gs pos="100000">
+              <a:schemeClr val="phClr">
+                <a:lumMod val="99000"/>
+                <a:satMod val="120000"/>
+                <a:shade val="78000"/>
+              </a:schemeClr>
+            </a:gs>
+          </a:gsLst>
+          <a:lin ang="5400000" scaled="0"/>
+        </a:gradFill>
+      </a:fillStyleLst>
+      <a:lnStyleLst>
+        <a:ln w="6350" cap="flat" cmpd="sng" algn="ctr">
+          <a:solidFill>
+            <a:schemeClr val="phClr"/>
+          </a:solidFill>
+          <a:prstDash val="solid"/>
+          <a:miter lim="800000"/>
+        </a:ln>
+        <a:ln w="12700" cap="flat" cmpd="sng" algn="ctr">
+          <a:solidFill>
+            <a:schemeClr val="phClr"/>
+          </a:solidFill>
+          <a:prstDash val="solid"/>
+          <a:miter lim="800000"/>
+        </a:ln>
+        <a:ln w="19050" cap="flat" cmpd="sng" algn="ctr">
+          <a:solidFill>
+            <a:schemeClr val="phClr"/>
+          </a:solidFill>
+          <a:prstDash val="solid"/>
+          <a:miter lim="800000"/>
+        </a:ln>
+      </a:lnStyleLst>
+      <a:effectStyleLst>
+        <a:effectStyle>
+          <a:effectLst/>
+        </a:effectStyle>
+        <a:effectStyle>
+          <a:effectLst/>
+        </a:effectStyle>
+        <a:effectStyle>
+          <a:effectLst>
+            <a:outerShdw blurRad="57150" dist="19050" dir="5400000" algn="ctr" rotWithShape="0">
+              <a:srgbClr val="000000">
+                <a:alpha val="63000"/>
+              </a:srgbClr>
+            </a:outerShdw>
+          </a:effectLst>
+        </a:effectStyle>
+      </a:effectStyleLst>
+      <a:bgFillStyleLst>
+        <a:solidFill>
+          <a:schemeClr val="phClr"/>
+        </a:solidFill>
+        <a:solidFill>
+          <a:schemeClr val="phClr">
+            <a:tint val="95000"/>
+            <a:satMod val="170000"/>
+          </a:schemeClr>
+        </a:solidFill>
+        <a:gradFill rotWithShape="1">
+          <a:gsLst>
+            <a:gs pos="0">
+              <a:schemeClr val="phClr">
+                <a:tint val="93000"/>
+                <a:satMod val="150000"/>
+                <a:shade val="98000"/>
+                <a:lumMod val="102000"/>
+              </a:schemeClr>
+            </a:gs>
+            <a:gs pos="50000">
+              <a:schemeClr val="phClr">
+                <a:tint val="98000"/>
+                <a:satMod val="130000"/>
+                <a:shade val="90000"/>
+                <a:lumMod val="103000"/>
+              </a:schemeClr>
+            </a:gs>
+            <a:gs pos="100000">
+              <a:schemeClr val="phClr">
+                <a:shade val="63000"/>
+                <a:satMod val="120000"/>
+              </a:schemeClr>
+            </a:gs>
+          </a:gsLst>
+          <a:lin ang="5400000" scaled="0"/>
+        </a:gradFill>
+      </a:bgFillStyleLst>
+    </a:fmtScheme>
+  </a:themeElements>
+  <a:objectDefaults/>
+  <a:extraClrSchemeLst/>
+  <a:extLst>
+    <a:ext uri="{05A4C25C-085E-4340-85A3-A5531E510DB2}">
+      <thm15:themeFamily xmlns:thm15="http://schemas.microsoft.com/office/thememl/2012/main" name="Office Theme" id="{62F939B6-93AF-4DB8-9C6B-D6C7DFDC589F}" vid="{4A3C46E8-61CC-4603-A589-7422A47A8E4A}"/>
+    </a:ext>
+  </a:extLst>
+</a:theme>
 </file>
</xml_diff>

<commit_message>
Added to Hype Cycle lecture
</commit_message>
<xml_diff>
--- a/Talk_EmergingTechnologies_MES_March13.pptx
+++ b/Talk_EmergingTechnologies_MES_March13.pptx
@@ -5,16 +5,23 @@
     <p:sldMasterId id="2147483648" r:id="rId1"/>
   </p:sldMasterIdLst>
   <p:notesMasterIdLst>
-    <p:notesMasterId r:id="rId9"/>
+    <p:notesMasterId r:id="rId16"/>
   </p:notesMasterIdLst>
   <p:sldIdLst>
     <p:sldId id="256" r:id="rId2"/>
-    <p:sldId id="257" r:id="rId3"/>
-    <p:sldId id="258" r:id="rId4"/>
-    <p:sldId id="259" r:id="rId5"/>
-    <p:sldId id="262" r:id="rId6"/>
-    <p:sldId id="260" r:id="rId7"/>
-    <p:sldId id="261" r:id="rId8"/>
+    <p:sldId id="258" r:id="rId3"/>
+    <p:sldId id="259" r:id="rId4"/>
+    <p:sldId id="260" r:id="rId5"/>
+    <p:sldId id="267" r:id="rId6"/>
+    <p:sldId id="270" r:id="rId7"/>
+    <p:sldId id="268" r:id="rId8"/>
+    <p:sldId id="269" r:id="rId9"/>
+    <p:sldId id="261" r:id="rId10"/>
+    <p:sldId id="265" r:id="rId11"/>
+    <p:sldId id="257" r:id="rId12"/>
+    <p:sldId id="266" r:id="rId13"/>
+    <p:sldId id="264" r:id="rId14"/>
+    <p:sldId id="263" r:id="rId15"/>
   </p:sldIdLst>
   <p:sldSz cx="12192000" cy="6858000"/>
   <p:notesSz cx="6858000" cy="9144000"/>
@@ -203,7 +210,7 @@
           <a:p>
             <a:fld id="{42F3D158-BD39-44E3-8BA8-DB88535CA5CA}" type="datetimeFigureOut">
               <a:rPr lang="en-US" smtClean="0"/>
-              <a:t>2/21/2021</a:t>
+              <a:t>3/3/2021</a:t>
             </a:fld>
             <a:endParaRPr lang="en-US"/>
           </a:p>
@@ -617,7 +624,7 @@
           <a:p>
             <a:fld id="{62EC7320-38BF-4449-BE1F-EC165202E8B9}" type="datetimeFigureOut">
               <a:rPr lang="en-US" smtClean="0"/>
-              <a:t>2/21/2021</a:t>
+              <a:t>3/3/2021</a:t>
             </a:fld>
             <a:endParaRPr lang="en-US"/>
           </a:p>
@@ -815,7 +822,7 @@
           <a:p>
             <a:fld id="{62EC7320-38BF-4449-BE1F-EC165202E8B9}" type="datetimeFigureOut">
               <a:rPr lang="en-US" smtClean="0"/>
-              <a:t>2/21/2021</a:t>
+              <a:t>3/3/2021</a:t>
             </a:fld>
             <a:endParaRPr lang="en-US"/>
           </a:p>
@@ -1023,7 +1030,7 @@
           <a:p>
             <a:fld id="{62EC7320-38BF-4449-BE1F-EC165202E8B9}" type="datetimeFigureOut">
               <a:rPr lang="en-US" smtClean="0"/>
-              <a:t>2/21/2021</a:t>
+              <a:t>3/3/2021</a:t>
             </a:fld>
             <a:endParaRPr lang="en-US"/>
           </a:p>
@@ -1221,7 +1228,7 @@
           <a:p>
             <a:fld id="{62EC7320-38BF-4449-BE1F-EC165202E8B9}" type="datetimeFigureOut">
               <a:rPr lang="en-US" smtClean="0"/>
-              <a:t>2/21/2021</a:t>
+              <a:t>3/3/2021</a:t>
             </a:fld>
             <a:endParaRPr lang="en-US"/>
           </a:p>
@@ -1496,7 +1503,7 @@
           <a:p>
             <a:fld id="{62EC7320-38BF-4449-BE1F-EC165202E8B9}" type="datetimeFigureOut">
               <a:rPr lang="en-US" smtClean="0"/>
-              <a:t>2/21/2021</a:t>
+              <a:t>3/3/2021</a:t>
             </a:fld>
             <a:endParaRPr lang="en-US"/>
           </a:p>
@@ -1761,7 +1768,7 @@
           <a:p>
             <a:fld id="{62EC7320-38BF-4449-BE1F-EC165202E8B9}" type="datetimeFigureOut">
               <a:rPr lang="en-US" smtClean="0"/>
-              <a:t>2/21/2021</a:t>
+              <a:t>3/3/2021</a:t>
             </a:fld>
             <a:endParaRPr lang="en-US"/>
           </a:p>
@@ -2173,7 +2180,7 @@
           <a:p>
             <a:fld id="{62EC7320-38BF-4449-BE1F-EC165202E8B9}" type="datetimeFigureOut">
               <a:rPr lang="en-US" smtClean="0"/>
-              <a:t>2/21/2021</a:t>
+              <a:t>3/3/2021</a:t>
             </a:fld>
             <a:endParaRPr lang="en-US"/>
           </a:p>
@@ -2314,7 +2321,7 @@
           <a:p>
             <a:fld id="{62EC7320-38BF-4449-BE1F-EC165202E8B9}" type="datetimeFigureOut">
               <a:rPr lang="en-US" smtClean="0"/>
-              <a:t>2/21/2021</a:t>
+              <a:t>3/3/2021</a:t>
             </a:fld>
             <a:endParaRPr lang="en-US"/>
           </a:p>
@@ -2427,7 +2434,7 @@
           <a:p>
             <a:fld id="{62EC7320-38BF-4449-BE1F-EC165202E8B9}" type="datetimeFigureOut">
               <a:rPr lang="en-US" smtClean="0"/>
-              <a:t>2/21/2021</a:t>
+              <a:t>3/3/2021</a:t>
             </a:fld>
             <a:endParaRPr lang="en-US"/>
           </a:p>
@@ -2738,7 +2745,7 @@
           <a:p>
             <a:fld id="{62EC7320-38BF-4449-BE1F-EC165202E8B9}" type="datetimeFigureOut">
               <a:rPr lang="en-US" smtClean="0"/>
-              <a:t>2/21/2021</a:t>
+              <a:t>3/3/2021</a:t>
             </a:fld>
             <a:endParaRPr lang="en-US"/>
           </a:p>
@@ -3026,7 +3033,7 @@
           <a:p>
             <a:fld id="{62EC7320-38BF-4449-BE1F-EC165202E8B9}" type="datetimeFigureOut">
               <a:rPr lang="en-US" smtClean="0"/>
-              <a:t>2/21/2021</a:t>
+              <a:t>3/3/2021</a:t>
             </a:fld>
             <a:endParaRPr lang="en-US"/>
           </a:p>
@@ -3267,7 +3274,7 @@
           <a:p>
             <a:fld id="{62EC7320-38BF-4449-BE1F-EC165202E8B9}" type="datetimeFigureOut">
               <a:rPr lang="en-US" smtClean="0"/>
-              <a:t>2/21/2021</a:t>
+              <a:t>3/3/2021</a:t>
             </a:fld>
             <a:endParaRPr lang="en-US"/>
           </a:p>
@@ -3753,6 +3760,555 @@
 </p:sld>
 </file>
 
+<file path=ppt/slides/slide10.xml><?xml version="1.0" encoding="utf-8"?>
+<p:sld xmlns:a="http://schemas.openxmlformats.org/drawingml/2006/main" xmlns:r="http://schemas.openxmlformats.org/officeDocument/2006/relationships" xmlns:p="http://schemas.openxmlformats.org/presentationml/2006/main">
+  <p:cSld>
+    <p:spTree>
+      <p:nvGrpSpPr>
+        <p:cNvPr id="1" name=""/>
+        <p:cNvGrpSpPr/>
+        <p:nvPr/>
+      </p:nvGrpSpPr>
+      <p:grpSpPr>
+        <a:xfrm>
+          <a:off x="0" y="0"/>
+          <a:ext cx="0" cy="0"/>
+          <a:chOff x="0" y="0"/>
+          <a:chExt cx="0" cy="0"/>
+        </a:xfrm>
+      </p:grpSpPr>
+      <p:pic>
+        <p:nvPicPr>
+          <p:cNvPr id="3" name="Picture 2">
+            <a:extLst>
+              <a:ext uri="{FF2B5EF4-FFF2-40B4-BE49-F238E27FC236}">
+                <a16:creationId xmlns:a16="http://schemas.microsoft.com/office/drawing/2014/main" id="{F187FA3B-D53E-4919-8CD8-3F5B9C011CDC}"/>
+              </a:ext>
+            </a:extLst>
+          </p:cNvPr>
+          <p:cNvPicPr>
+            <a:picLocks noChangeAspect="1"/>
+          </p:cNvPicPr>
+          <p:nvPr/>
+        </p:nvPicPr>
+        <p:blipFill>
+          <a:blip r:embed="rId2"/>
+          <a:stretch>
+            <a:fillRect/>
+          </a:stretch>
+        </p:blipFill>
+        <p:spPr>
+          <a:xfrm>
+            <a:off x="3048000" y="381000"/>
+            <a:ext cx="6096000" cy="6096000"/>
+          </a:xfrm>
+          <a:prstGeom prst="rect">
+            <a:avLst/>
+          </a:prstGeom>
+        </p:spPr>
+      </p:pic>
+    </p:spTree>
+    <p:extLst>
+      <p:ext uri="{BB962C8B-B14F-4D97-AF65-F5344CB8AC3E}">
+        <p14:creationId xmlns:p14="http://schemas.microsoft.com/office/powerpoint/2010/main" val="1569629376"/>
+      </p:ext>
+    </p:extLst>
+  </p:cSld>
+  <p:clrMapOvr>
+    <a:masterClrMapping/>
+  </p:clrMapOvr>
+</p:sld>
+</file>
+
+<file path=ppt/slides/slide11.xml><?xml version="1.0" encoding="utf-8"?>
+<p:sld xmlns:a="http://schemas.openxmlformats.org/drawingml/2006/main" xmlns:r="http://schemas.openxmlformats.org/officeDocument/2006/relationships" xmlns:p="http://schemas.openxmlformats.org/presentationml/2006/main">
+  <p:cSld>
+    <p:spTree>
+      <p:nvGrpSpPr>
+        <p:cNvPr id="1" name=""/>
+        <p:cNvGrpSpPr/>
+        <p:nvPr/>
+      </p:nvGrpSpPr>
+      <p:grpSpPr>
+        <a:xfrm>
+          <a:off x="0" y="0"/>
+          <a:ext cx="0" cy="0"/>
+          <a:chOff x="0" y="0"/>
+          <a:chExt cx="0" cy="0"/>
+        </a:xfrm>
+      </p:grpSpPr>
+      <p:sp>
+        <p:nvSpPr>
+          <p:cNvPr id="2" name="Title 1">
+            <a:extLst>
+              <a:ext uri="{FF2B5EF4-FFF2-40B4-BE49-F238E27FC236}">
+                <a16:creationId xmlns:a16="http://schemas.microsoft.com/office/drawing/2014/main" id="{B081205F-43D0-4A27-AAC7-833306EB0789}"/>
+              </a:ext>
+            </a:extLst>
+          </p:cNvPr>
+          <p:cNvSpPr>
+            <a:spLocks noGrp="1"/>
+          </p:cNvSpPr>
+          <p:nvPr>
+            <p:ph type="title"/>
+          </p:nvPr>
+        </p:nvSpPr>
+        <p:spPr/>
+        <p:txBody>
+          <a:bodyPr/>
+          <a:lstStyle/>
+          <a:p>
+            <a:r>
+              <a:rPr lang="en-US" dirty="0"/>
+              <a:t>The Goal: Happiness</a:t>
+            </a:r>
+          </a:p>
+        </p:txBody>
+      </p:sp>
+      <p:sp>
+        <p:nvSpPr>
+          <p:cNvPr id="3" name="Content Placeholder 2">
+            <a:extLst>
+              <a:ext uri="{FF2B5EF4-FFF2-40B4-BE49-F238E27FC236}">
+                <a16:creationId xmlns:a16="http://schemas.microsoft.com/office/drawing/2014/main" id="{A3D9AE13-6127-49EE-A389-524033794DA4}"/>
+              </a:ext>
+            </a:extLst>
+          </p:cNvPr>
+          <p:cNvSpPr>
+            <a:spLocks noGrp="1"/>
+          </p:cNvSpPr>
+          <p:nvPr>
+            <p:ph idx="1"/>
+          </p:nvPr>
+        </p:nvSpPr>
+        <p:spPr/>
+        <p:txBody>
+          <a:bodyPr>
+            <a:normAutofit lnSpcReduction="10000"/>
+          </a:bodyPr>
+          <a:lstStyle/>
+          <a:p>
+            <a:r>
+              <a:rPr lang="en-IN" dirty="0"/>
+              <a:t>Happiness = Health + Wealth + Good Relationships</a:t>
+            </a:r>
+          </a:p>
+          <a:p>
+            <a:r>
+              <a:rPr lang="en-IN" dirty="0"/>
+              <a:t>Health = Exercise + Diet + Sleep</a:t>
+            </a:r>
+          </a:p>
+          <a:p>
+            <a:pPr lvl="1"/>
+            <a:r>
+              <a:rPr lang="en-IN" dirty="0"/>
+              <a:t>Exercise = High Intensity Resistance Training + Sports + Rest</a:t>
+            </a:r>
+          </a:p>
+          <a:p>
+            <a:pPr lvl="1"/>
+            <a:r>
+              <a:rPr lang="en-IN" dirty="0"/>
+              <a:t>Diet = Natural Foods + Intermittent Fasting + Plants</a:t>
+            </a:r>
+          </a:p>
+          <a:p>
+            <a:pPr lvl="1"/>
+            <a:r>
+              <a:rPr lang="en-IN" dirty="0"/>
+              <a:t>Sleep = No alarms + 8–9 hours + Circadian rhythms</a:t>
+            </a:r>
+          </a:p>
+          <a:p>
+            <a:r>
+              <a:rPr lang="en-US" dirty="0"/>
+              <a:t>Wealth = Income + Assets-that-earn-while-you-sleep * (</a:t>
+            </a:r>
+            <a:r>
+              <a:rPr lang="en-US" dirty="0" err="1"/>
+              <a:t>RoI</a:t>
+            </a:r>
+            <a:r>
+              <a:rPr lang="en-US" dirty="0"/>
+              <a:t>) </a:t>
+            </a:r>
+          </a:p>
+          <a:p>
+            <a:pPr lvl="1"/>
+            <a:r>
+              <a:rPr lang="en-US" dirty="0"/>
+              <a:t>Income = Accountability + Leverage + Specific Knowledge </a:t>
+            </a:r>
+          </a:p>
+          <a:p>
+            <a:pPr lvl="2"/>
+            <a:r>
+              <a:rPr lang="en-US" dirty="0"/>
+              <a:t>Accountability = Personal Branding + Personal Platform + Taking Risk? </a:t>
+            </a:r>
+          </a:p>
+          <a:p>
+            <a:pPr lvl="2"/>
+            <a:r>
+              <a:rPr lang="en-US" dirty="0"/>
+              <a:t>Leverage = Capital + People + Intellectual Property </a:t>
+            </a:r>
+          </a:p>
+          <a:p>
+            <a:pPr lvl="2"/>
+            <a:r>
+              <a:rPr lang="en-US" dirty="0"/>
+              <a:t>Specific Knowledge = Knowing to do something society cannot yet easily train others</a:t>
+            </a:r>
+          </a:p>
+          <a:p>
+            <a:pPr lvl="1"/>
+            <a:r>
+              <a:rPr lang="en-US" dirty="0"/>
+              <a:t>Return on Investment = ``Buy-and-Hold'' + Valuation + Margin of Safety</a:t>
+            </a:r>
+          </a:p>
+        </p:txBody>
+      </p:sp>
+    </p:spTree>
+    <p:extLst>
+      <p:ext uri="{BB962C8B-B14F-4D97-AF65-F5344CB8AC3E}">
+        <p14:creationId xmlns:p14="http://schemas.microsoft.com/office/powerpoint/2010/main" val="1739440550"/>
+      </p:ext>
+    </p:extLst>
+  </p:cSld>
+  <p:clrMapOvr>
+    <a:masterClrMapping/>
+  </p:clrMapOvr>
+</p:sld>
+</file>
+
+<file path=ppt/slides/slide12.xml><?xml version="1.0" encoding="utf-8"?>
+<p:sld xmlns:a="http://schemas.openxmlformats.org/drawingml/2006/main" xmlns:r="http://schemas.openxmlformats.org/officeDocument/2006/relationships" xmlns:p="http://schemas.openxmlformats.org/presentationml/2006/main">
+  <p:cSld>
+    <p:spTree>
+      <p:nvGrpSpPr>
+        <p:cNvPr id="1" name=""/>
+        <p:cNvGrpSpPr/>
+        <p:nvPr/>
+      </p:nvGrpSpPr>
+      <p:grpSpPr>
+        <a:xfrm>
+          <a:off x="0" y="0"/>
+          <a:ext cx="0" cy="0"/>
+          <a:chOff x="0" y="0"/>
+          <a:chExt cx="0" cy="0"/>
+        </a:xfrm>
+      </p:grpSpPr>
+      <p:sp>
+        <p:nvSpPr>
+          <p:cNvPr id="2" name="Title 1">
+            <a:extLst>
+              <a:ext uri="{FF2B5EF4-FFF2-40B4-BE49-F238E27FC236}">
+                <a16:creationId xmlns:a16="http://schemas.microsoft.com/office/drawing/2014/main" id="{BFF76977-ED70-4D7E-95F3-B74CDCC1CF5C}"/>
+              </a:ext>
+            </a:extLst>
+          </p:cNvPr>
+          <p:cNvSpPr>
+            <a:spLocks noGrp="1"/>
+          </p:cNvSpPr>
+          <p:nvPr>
+            <p:ph type="title"/>
+          </p:nvPr>
+        </p:nvSpPr>
+        <p:spPr/>
+        <p:txBody>
+          <a:bodyPr/>
+          <a:lstStyle/>
+          <a:p>
+            <a:r>
+              <a:rPr lang="en-US" dirty="0"/>
+              <a:t>$$$</a:t>
+            </a:r>
+          </a:p>
+        </p:txBody>
+      </p:sp>
+      <p:sp>
+        <p:nvSpPr>
+          <p:cNvPr id="3" name="Content Placeholder 2">
+            <a:extLst>
+              <a:ext uri="{FF2B5EF4-FFF2-40B4-BE49-F238E27FC236}">
+                <a16:creationId xmlns:a16="http://schemas.microsoft.com/office/drawing/2014/main" id="{744F632F-75B5-435F-9B96-CF677FF7BC65}"/>
+              </a:ext>
+            </a:extLst>
+          </p:cNvPr>
+          <p:cNvSpPr>
+            <a:spLocks noGrp="1"/>
+          </p:cNvSpPr>
+          <p:nvPr>
+            <p:ph idx="1"/>
+          </p:nvPr>
+        </p:nvSpPr>
+        <p:spPr/>
+        <p:txBody>
+          <a:bodyPr/>
+          <a:lstStyle/>
+          <a:p>
+            <a:pPr marL="0" indent="0">
+              <a:buNone/>
+            </a:pPr>
+            <a:r>
+              <a:rPr lang="en-US" dirty="0"/>
+              <a:t>YOU need to get PAID at SCALE.</a:t>
+            </a:r>
+          </a:p>
+          <a:p>
+            <a:r>
+              <a:rPr lang="en-US" dirty="0"/>
+              <a:t>YOU – your uniqueness, and accountability.</a:t>
+            </a:r>
+          </a:p>
+          <a:p>
+            <a:r>
+              <a:rPr lang="en-US" dirty="0"/>
+              <a:t>PAID – your specific knowledge and judgement.</a:t>
+            </a:r>
+          </a:p>
+          <a:p>
+            <a:r>
+              <a:rPr lang="en-US" dirty="0"/>
+              <a:t>SCALE – the leverage you’re able to deploy.</a:t>
+            </a:r>
+          </a:p>
+        </p:txBody>
+      </p:sp>
+    </p:spTree>
+    <p:extLst>
+      <p:ext uri="{BB962C8B-B14F-4D97-AF65-F5344CB8AC3E}">
+        <p14:creationId xmlns:p14="http://schemas.microsoft.com/office/powerpoint/2010/main" val="1908311116"/>
+      </p:ext>
+    </p:extLst>
+  </p:cSld>
+  <p:clrMapOvr>
+    <a:masterClrMapping/>
+  </p:clrMapOvr>
+</p:sld>
+</file>
+
+<file path=ppt/slides/slide13.xml><?xml version="1.0" encoding="utf-8"?>
+<p:sld xmlns:a="http://schemas.openxmlformats.org/drawingml/2006/main" xmlns:r="http://schemas.openxmlformats.org/officeDocument/2006/relationships" xmlns:p="http://schemas.openxmlformats.org/presentationml/2006/main">
+  <p:cSld>
+    <p:spTree>
+      <p:nvGrpSpPr>
+        <p:cNvPr id="1" name=""/>
+        <p:cNvGrpSpPr/>
+        <p:nvPr/>
+      </p:nvGrpSpPr>
+      <p:grpSpPr>
+        <a:xfrm>
+          <a:off x="0" y="0"/>
+          <a:ext cx="0" cy="0"/>
+          <a:chOff x="0" y="0"/>
+          <a:chExt cx="0" cy="0"/>
+        </a:xfrm>
+      </p:grpSpPr>
+      <p:pic>
+        <p:nvPicPr>
+          <p:cNvPr id="1030" name="Picture 6" descr="50+] White Nike Wallpaper on WallpaperSafari">
+            <a:extLst>
+              <a:ext uri="{FF2B5EF4-FFF2-40B4-BE49-F238E27FC236}">
+                <a16:creationId xmlns:a16="http://schemas.microsoft.com/office/drawing/2014/main" id="{4ECE2DBD-BC1E-4978-BABA-2274A518BDC5}"/>
+              </a:ext>
+            </a:extLst>
+          </p:cNvPr>
+          <p:cNvPicPr>
+            <a:picLocks noChangeAspect="1" noChangeArrowheads="1"/>
+          </p:cNvPicPr>
+          <p:nvPr/>
+        </p:nvPicPr>
+        <p:blipFill>
+          <a:blip r:embed="rId2">
+            <a:extLst>
+              <a:ext uri="{28A0092B-C50C-407E-A947-70E740481C1C}">
+                <a14:useLocalDpi xmlns:a14="http://schemas.microsoft.com/office/drawing/2010/main" val="0"/>
+              </a:ext>
+            </a:extLst>
+          </a:blip>
+          <a:srcRect/>
+          <a:stretch>
+            <a:fillRect/>
+          </a:stretch>
+        </p:blipFill>
+        <p:spPr bwMode="auto">
+          <a:xfrm>
+            <a:off x="2496000" y="1404000"/>
+            <a:ext cx="7200000" cy="4050000"/>
+          </a:xfrm>
+          <a:prstGeom prst="rect">
+            <a:avLst/>
+          </a:prstGeom>
+          <a:noFill/>
+          <a:extLst>
+            <a:ext uri="{909E8E84-426E-40DD-AFC4-6F175D3DCCD1}">
+              <a14:hiddenFill xmlns:a14="http://schemas.microsoft.com/office/drawing/2010/main">
+                <a:solidFill>
+                  <a:srgbClr val="FFFFFF"/>
+                </a:solidFill>
+              </a14:hiddenFill>
+            </a:ext>
+          </a:extLst>
+        </p:spPr>
+      </p:pic>
+    </p:spTree>
+    <p:extLst>
+      <p:ext uri="{BB962C8B-B14F-4D97-AF65-F5344CB8AC3E}">
+        <p14:creationId xmlns:p14="http://schemas.microsoft.com/office/powerpoint/2010/main" val="1468308730"/>
+      </p:ext>
+    </p:extLst>
+  </p:cSld>
+  <p:clrMapOvr>
+    <a:masterClrMapping/>
+  </p:clrMapOvr>
+</p:sld>
+</file>
+
+<file path=ppt/slides/slide14.xml><?xml version="1.0" encoding="utf-8"?>
+<p:sld xmlns:a="http://schemas.openxmlformats.org/drawingml/2006/main" xmlns:r="http://schemas.openxmlformats.org/officeDocument/2006/relationships" xmlns:p="http://schemas.openxmlformats.org/presentationml/2006/main">
+  <p:cSld>
+    <p:spTree>
+      <p:nvGrpSpPr>
+        <p:cNvPr id="1" name=""/>
+        <p:cNvGrpSpPr/>
+        <p:nvPr/>
+      </p:nvGrpSpPr>
+      <p:grpSpPr>
+        <a:xfrm>
+          <a:off x="0" y="0"/>
+          <a:ext cx="0" cy="0"/>
+          <a:chOff x="0" y="0"/>
+          <a:chExt cx="0" cy="0"/>
+        </a:xfrm>
+      </p:grpSpPr>
+      <p:sp>
+        <p:nvSpPr>
+          <p:cNvPr id="2" name="Title 1">
+            <a:extLst>
+              <a:ext uri="{FF2B5EF4-FFF2-40B4-BE49-F238E27FC236}">
+                <a16:creationId xmlns:a16="http://schemas.microsoft.com/office/drawing/2014/main" id="{E835D4A3-33ED-435D-9363-BB36A4CCB186}"/>
+              </a:ext>
+            </a:extLst>
+          </p:cNvPr>
+          <p:cNvSpPr>
+            <a:spLocks noGrp="1"/>
+          </p:cNvSpPr>
+          <p:nvPr>
+            <p:ph type="title"/>
+          </p:nvPr>
+        </p:nvSpPr>
+        <p:spPr/>
+        <p:txBody>
+          <a:bodyPr/>
+          <a:lstStyle/>
+          <a:p>
+            <a:r>
+              <a:rPr lang="en-US" dirty="0"/>
+              <a:t>To find me...</a:t>
+            </a:r>
+          </a:p>
+        </p:txBody>
+      </p:sp>
+      <p:sp>
+        <p:nvSpPr>
+          <p:cNvPr id="3" name="Content Placeholder 2">
+            <a:extLst>
+              <a:ext uri="{FF2B5EF4-FFF2-40B4-BE49-F238E27FC236}">
+                <a16:creationId xmlns:a16="http://schemas.microsoft.com/office/drawing/2014/main" id="{2F234F4E-FAB2-4AE4-826A-1A0547470EB8}"/>
+              </a:ext>
+            </a:extLst>
+          </p:cNvPr>
+          <p:cNvSpPr>
+            <a:spLocks noGrp="1"/>
+          </p:cNvSpPr>
+          <p:nvPr>
+            <p:ph idx="1"/>
+          </p:nvPr>
+        </p:nvSpPr>
+        <p:spPr/>
+        <p:txBody>
+          <a:bodyPr/>
+          <a:lstStyle/>
+          <a:p>
+            <a:pPr>
+              <a:buFont typeface="Calibri" panose="020F0502020204030204" pitchFamily="34" charset="0"/>
+              <a:buChar char="‐"/>
+            </a:pPr>
+            <a:r>
+              <a:rPr lang="en-IN" dirty="0"/>
+              <a:t>!WhatsApp</a:t>
+            </a:r>
+          </a:p>
+          <a:p>
+            <a:pPr>
+              <a:buFont typeface="Calibri" panose="020F0502020204030204" pitchFamily="34" charset="0"/>
+              <a:buChar char="‐"/>
+            </a:pPr>
+            <a:r>
+              <a:rPr lang="en-IN" dirty="0"/>
+              <a:t>!Facebook</a:t>
+            </a:r>
+          </a:p>
+          <a:p>
+            <a:pPr>
+              <a:buFont typeface="Calibri" panose="020F0502020204030204" pitchFamily="34" charset="0"/>
+              <a:buChar char="‐"/>
+            </a:pPr>
+            <a:r>
+              <a:rPr lang="en-IN" dirty="0"/>
+              <a:t>~Twitter</a:t>
+            </a:r>
+          </a:p>
+          <a:p>
+            <a:pPr>
+              <a:buFont typeface="Calibri" panose="020F0502020204030204" pitchFamily="34" charset="0"/>
+              <a:buChar char="‐"/>
+            </a:pPr>
+            <a:r>
+              <a:rPr lang="en-IN" dirty="0"/>
+              <a:t>Career talk @ YouTube</a:t>
+            </a:r>
+          </a:p>
+          <a:p>
+            <a:pPr>
+              <a:buFont typeface="Calibri" panose="020F0502020204030204" pitchFamily="34" charset="0"/>
+              <a:buChar char="‐"/>
+            </a:pPr>
+            <a:r>
+              <a:rPr lang="en-IN" dirty="0"/>
+              <a:t>Always on LinkedIn</a:t>
+            </a:r>
+          </a:p>
+          <a:p>
+            <a:pPr>
+              <a:buFont typeface="Calibri" panose="020F0502020204030204" pitchFamily="34" charset="0"/>
+              <a:buChar char="‐"/>
+            </a:pPr>
+            <a:r>
+              <a:rPr lang="en-IN" dirty="0"/>
+              <a:t>Email yogeshkulkarni@yahoo.com</a:t>
+            </a:r>
+            <a:endParaRPr lang="en-US" dirty="0"/>
+          </a:p>
+        </p:txBody>
+      </p:sp>
+    </p:spTree>
+    <p:extLst>
+      <p:ext uri="{BB962C8B-B14F-4D97-AF65-F5344CB8AC3E}">
+        <p14:creationId xmlns:p14="http://schemas.microsoft.com/office/powerpoint/2010/main" val="1399808059"/>
+      </p:ext>
+    </p:extLst>
+  </p:cSld>
+  <p:clrMapOvr>
+    <a:masterClrMapping/>
+  </p:clrMapOvr>
+</p:sld>
+</file>
+
 <file path=ppt/slides/slide2.xml><?xml version="1.0" encoding="utf-8"?>
 <p:sld xmlns:a="http://schemas.openxmlformats.org/drawingml/2006/main" xmlns:r="http://schemas.openxmlformats.org/officeDocument/2006/relationships" xmlns:p="http://schemas.openxmlformats.org/presentationml/2006/main">
   <p:cSld>
@@ -3775,7 +4331,7 @@
           <p:cNvPr id="2" name="Title 1">
             <a:extLst>
               <a:ext uri="{FF2B5EF4-FFF2-40B4-BE49-F238E27FC236}">
-                <a16:creationId xmlns:a16="http://schemas.microsoft.com/office/drawing/2014/main" id="{B081205F-43D0-4A27-AAC7-833306EB0789}"/>
+                <a16:creationId xmlns:a16="http://schemas.microsoft.com/office/drawing/2014/main" id="{372DEC65-7CF9-40B7-935E-82D100C8C5B4}"/>
               </a:ext>
             </a:extLst>
           </p:cNvPr>
@@ -3792,133 +4348,51 @@
           <a:lstStyle/>
           <a:p>
             <a:r>
-              <a:rPr lang="en-US"/>
-              <a:t>Expand</a:t>
-            </a:r>
-            <a:endParaRPr lang="en-US" dirty="0"/>
-          </a:p>
-        </p:txBody>
-      </p:sp>
-      <p:sp>
-        <p:nvSpPr>
-          <p:cNvPr id="3" name="Content Placeholder 2">
-            <a:extLst>
-              <a:ext uri="{FF2B5EF4-FFF2-40B4-BE49-F238E27FC236}">
-                <a16:creationId xmlns:a16="http://schemas.microsoft.com/office/drawing/2014/main" id="{A3D9AE13-6127-49EE-A389-524033794DA4}"/>
-              </a:ext>
-            </a:extLst>
-          </p:cNvPr>
-          <p:cNvSpPr>
-            <a:spLocks noGrp="1"/>
-          </p:cNvSpPr>
-          <p:nvPr>
-            <p:ph idx="1"/>
+              <a:rPr lang="en-US" dirty="0"/>
+              <a:t>What got you here,</a:t>
+            </a:r>
+            <a:br>
+              <a:rPr lang="en-US" dirty="0"/>
+            </a:br>
+            <a:r>
+              <a:rPr lang="en-US" dirty="0"/>
+              <a:t>Won’t get you there!!</a:t>
+            </a:r>
+          </a:p>
+        </p:txBody>
+      </p:sp>
+      <p:sp>
+        <p:nvSpPr>
+          <p:cNvPr id="3" name="Text Placeholder 2">
+            <a:extLst>
+              <a:ext uri="{FF2B5EF4-FFF2-40B4-BE49-F238E27FC236}">
+                <a16:creationId xmlns:a16="http://schemas.microsoft.com/office/drawing/2014/main" id="{595B51CB-FD5E-484E-8424-C0A9C9991742}"/>
+              </a:ext>
+            </a:extLst>
+          </p:cNvPr>
+          <p:cNvSpPr>
+            <a:spLocks noGrp="1"/>
+          </p:cNvSpPr>
+          <p:nvPr>
+            <p:ph type="body" idx="1"/>
           </p:nvPr>
         </p:nvSpPr>
         <p:spPr/>
         <p:txBody>
-          <a:bodyPr>
-            <a:normAutofit fontScale="92500" lnSpcReduction="10000"/>
-          </a:bodyPr>
-          <a:lstStyle/>
-          <a:p>
-            <a:r>
-              <a:rPr lang="en-IN" dirty="0"/>
-              <a:t>"Emerging Technology" &amp; Advice</a:t>
-            </a:r>
-            <a:br>
-              <a:rPr lang="en-IN" dirty="0"/>
-            </a:br>
-            <a:r>
-              <a:rPr lang="en-IN" dirty="0"/>
-              <a:t>- Part I: Hype Cycle + new tech, AI applications</a:t>
-            </a:r>
-            <a:br>
-              <a:rPr lang="en-IN" dirty="0"/>
-            </a:br>
-            <a:r>
-              <a:rPr lang="en-IN" dirty="0"/>
-              <a:t>- Part II: IKIGAI, Specific Knowledge, Naval Notes</a:t>
-            </a:r>
-            <a:br>
-              <a:rPr lang="en-IN" dirty="0"/>
-            </a:br>
-            <a:r>
-              <a:rPr lang="en-IN" dirty="0"/>
-              <a:t>- Ref my </a:t>
-            </a:r>
-            <a:r>
-              <a:rPr lang="en-IN" dirty="0" err="1"/>
-              <a:t>misc</a:t>
-            </a:r>
-            <a:r>
-              <a:rPr lang="en-IN" dirty="0"/>
-              <a:t> notes, put a thought/slide</a:t>
-            </a:r>
-            <a:br>
-              <a:rPr lang="en-IN" dirty="0"/>
-            </a:br>
-            <a:r>
-              <a:rPr lang="en-IN" dirty="0"/>
-              <a:t>- Social Media for me: !WhatsApp, !Facebook, read Twitter, write LinkedIn</a:t>
-            </a:r>
-            <a:br>
-              <a:rPr lang="en-IN" dirty="0"/>
-            </a:br>
-            <a:r>
-              <a:rPr lang="en-IN" dirty="0"/>
-              <a:t>- End slide: just show Nike </a:t>
-            </a:r>
-            <a:r>
-              <a:rPr lang="en-IN" dirty="0" err="1"/>
-              <a:t>sush</a:t>
-            </a:r>
-            <a:br>
-              <a:rPr lang="en-IN" dirty="0"/>
-            </a:br>
-            <a:br>
-              <a:rPr lang="en-IN" dirty="0"/>
-            </a:br>
-            <a:r>
-              <a:rPr lang="en-IN" dirty="0"/>
-              <a:t>Happiness = Health + Wealth + Good Relationships</a:t>
-            </a:r>
-            <a:br>
-              <a:rPr lang="en-IN" dirty="0"/>
-            </a:br>
-            <a:r>
-              <a:rPr lang="en-IN" dirty="0"/>
-              <a:t>→ Health = Exercise + Diet + Sleep</a:t>
-            </a:r>
-            <a:br>
-              <a:rPr lang="en-IN" dirty="0"/>
-            </a:br>
-            <a:r>
-              <a:rPr lang="en-IN" dirty="0"/>
-              <a:t>→ Exercise = High Intensity Resistance Training + Sports + Rest</a:t>
-            </a:r>
-            <a:br>
-              <a:rPr lang="en-IN" dirty="0"/>
-            </a:br>
-            <a:r>
-              <a:rPr lang="en-IN" dirty="0"/>
-              <a:t>→ Diet = Natural Foods + Intermittent Fasting + Plants</a:t>
-            </a:r>
-            <a:br>
-              <a:rPr lang="en-IN" dirty="0"/>
-            </a:br>
-            <a:r>
-              <a:rPr lang="en-IN" dirty="0"/>
-              <a:t>→ Sleep = No alarms + 8–9 hours + Circadian rhythms</a:t>
-            </a:r>
-            <a:endParaRPr lang="en-US" dirty="0"/>
+          <a:bodyPr/>
+          <a:lstStyle/>
+          <a:p>
+            <a:r>
+              <a:rPr lang="en-US" dirty="0"/>
+              <a:t>- Marshall Goldsmith</a:t>
+            </a:r>
           </a:p>
         </p:txBody>
       </p:sp>
     </p:spTree>
     <p:extLst>
       <p:ext uri="{BB962C8B-B14F-4D97-AF65-F5344CB8AC3E}">
-        <p14:creationId xmlns:p14="http://schemas.microsoft.com/office/powerpoint/2010/main" val="1739440550"/>
+        <p14:creationId xmlns:p14="http://schemas.microsoft.com/office/powerpoint/2010/main" val="2786094835"/>
       </p:ext>
     </p:extLst>
   </p:cSld>
@@ -3950,7 +4424,7 @@
           <p:cNvPr id="2" name="Title 1">
             <a:extLst>
               <a:ext uri="{FF2B5EF4-FFF2-40B4-BE49-F238E27FC236}">
-                <a16:creationId xmlns:a16="http://schemas.microsoft.com/office/drawing/2014/main" id="{372DEC65-7CF9-40B7-935E-82D100C8C5B4}"/>
+                <a16:creationId xmlns:a16="http://schemas.microsoft.com/office/drawing/2014/main" id="{63D40543-BC75-4773-AF53-D5276182D25E}"/>
               </a:ext>
             </a:extLst>
           </p:cNvPr>
@@ -3968,42 +4442,283 @@
           <a:p>
             <a:r>
               <a:rPr lang="en-US" dirty="0"/>
-              <a:t>What got you here,</a:t>
-            </a:r>
-            <a:br>
+              <a:t>About the Future*</a:t>
+            </a:r>
+          </a:p>
+        </p:txBody>
+      </p:sp>
+      <p:sp>
+        <p:nvSpPr>
+          <p:cNvPr id="3" name="Content Placeholder 2">
+            <a:extLst>
+              <a:ext uri="{FF2B5EF4-FFF2-40B4-BE49-F238E27FC236}">
+                <a16:creationId xmlns:a16="http://schemas.microsoft.com/office/drawing/2014/main" id="{950ADC3F-103E-494F-AC14-A9CD23DA1717}"/>
+              </a:ext>
+            </a:extLst>
+          </p:cNvPr>
+          <p:cNvSpPr>
+            <a:spLocks noGrp="1"/>
+          </p:cNvSpPr>
+          <p:nvPr>
+            <p:ph idx="1"/>
+          </p:nvPr>
+        </p:nvSpPr>
+        <p:spPr/>
+        <p:txBody>
+          <a:bodyPr>
+            <a:normAutofit/>
+          </a:bodyPr>
+          <a:lstStyle/>
+          <a:p>
+            <a:pPr marL="514350" indent="-514350">
+              <a:buFont typeface="+mj-lt"/>
+              <a:buAutoNum type="arabicPeriod"/>
+            </a:pPr>
+            <a:r>
               <a:rPr lang="en-US" dirty="0"/>
-            </a:br>
+              <a:t>Hype Cycles</a:t>
+            </a:r>
+          </a:p>
+          <a:p>
+            <a:pPr marL="514350" indent="-514350">
+              <a:buFont typeface="+mj-lt"/>
+              <a:buAutoNum type="arabicPeriod"/>
+            </a:pPr>
             <a:r>
               <a:rPr lang="en-US" dirty="0"/>
-              <a:t>Won’t get you there!!</a:t>
-            </a:r>
-          </a:p>
-        </p:txBody>
-      </p:sp>
-      <p:sp>
-        <p:nvSpPr>
-          <p:cNvPr id="3" name="Text Placeholder 2">
-            <a:extLst>
-              <a:ext uri="{FF2B5EF4-FFF2-40B4-BE49-F238E27FC236}">
-                <a16:creationId xmlns:a16="http://schemas.microsoft.com/office/drawing/2014/main" id="{595B51CB-FD5E-484E-8424-C0A9C9991742}"/>
-              </a:ext>
-            </a:extLst>
-          </p:cNvPr>
-          <p:cNvSpPr>
-            <a:spLocks noGrp="1"/>
-          </p:cNvSpPr>
-          <p:nvPr>
-            <p:ph type="body" idx="1"/>
-          </p:nvPr>
-        </p:nvSpPr>
-        <p:spPr/>
-        <p:txBody>
-          <a:bodyPr/>
-          <a:lstStyle/>
-          <a:p>
-            <a:r>
-              <a:rPr lang="en-US" dirty="0"/>
-              <a:t>- Marshall Goldsmith</a:t>
+              <a:t>IKIGAI</a:t>
+            </a:r>
+          </a:p>
+          <a:p>
+            <a:pPr marL="0" indent="0">
+              <a:buNone/>
+            </a:pPr>
+            <a:endParaRPr lang="en-US" dirty="0"/>
+          </a:p>
+        </p:txBody>
+      </p:sp>
+      <p:sp>
+        <p:nvSpPr>
+          <p:cNvPr id="4" name="Content Placeholder 2">
+            <a:extLst>
+              <a:ext uri="{FF2B5EF4-FFF2-40B4-BE49-F238E27FC236}">
+                <a16:creationId xmlns:a16="http://schemas.microsoft.com/office/drawing/2014/main" id="{BFD009D1-B624-43F2-9830-7D0593E8A7B1}"/>
+              </a:ext>
+            </a:extLst>
+          </p:cNvPr>
+          <p:cNvSpPr txBox="1">
+            <a:spLocks/>
+          </p:cNvSpPr>
+          <p:nvPr/>
+        </p:nvSpPr>
+        <p:spPr>
+          <a:xfrm>
+            <a:off x="838200" y="4677085"/>
+            <a:ext cx="10515600" cy="1634815"/>
+          </a:xfrm>
+          <a:prstGeom prst="rect">
+            <a:avLst/>
+          </a:prstGeom>
+        </p:spPr>
+        <p:txBody>
+          <a:bodyPr vert="horz" lIns="91440" tIns="45720" rIns="91440" bIns="45720" rtlCol="0">
+            <a:normAutofit fontScale="77500" lnSpcReduction="20000"/>
+          </a:bodyPr>
+          <a:lstStyle>
+            <a:lvl1pPr marL="228600" indent="-228600" algn="l" defTabSz="914400" rtl="0" eaLnBrk="1" latinLnBrk="0" hangingPunct="1">
+              <a:lnSpc>
+                <a:spcPct val="90000"/>
+              </a:lnSpc>
+              <a:spcBef>
+                <a:spcPts val="1000"/>
+              </a:spcBef>
+              <a:buFont typeface="Arial" panose="020B0604020202020204" pitchFamily="34" charset="0"/>
+              <a:buChar char="•"/>
+              <a:defRPr sz="2800" kern="1200">
+                <a:solidFill>
+                  <a:schemeClr val="tx1"/>
+                </a:solidFill>
+                <a:latin typeface="+mn-lt"/>
+                <a:ea typeface="+mn-ea"/>
+                <a:cs typeface="+mn-cs"/>
+              </a:defRPr>
+            </a:lvl1pPr>
+            <a:lvl2pPr marL="685800" indent="-228600" algn="l" defTabSz="914400" rtl="0" eaLnBrk="1" latinLnBrk="0" hangingPunct="1">
+              <a:lnSpc>
+                <a:spcPct val="90000"/>
+              </a:lnSpc>
+              <a:spcBef>
+                <a:spcPts val="500"/>
+              </a:spcBef>
+              <a:buFont typeface="Arial" panose="020B0604020202020204" pitchFamily="34" charset="0"/>
+              <a:buChar char="•"/>
+              <a:defRPr sz="2400" kern="1200">
+                <a:solidFill>
+                  <a:schemeClr val="tx1"/>
+                </a:solidFill>
+                <a:latin typeface="+mn-lt"/>
+                <a:ea typeface="+mn-ea"/>
+                <a:cs typeface="+mn-cs"/>
+              </a:defRPr>
+            </a:lvl2pPr>
+            <a:lvl3pPr marL="1143000" indent="-228600" algn="l" defTabSz="914400" rtl="0" eaLnBrk="1" latinLnBrk="0" hangingPunct="1">
+              <a:lnSpc>
+                <a:spcPct val="90000"/>
+              </a:lnSpc>
+              <a:spcBef>
+                <a:spcPts val="500"/>
+              </a:spcBef>
+              <a:buFont typeface="Arial" panose="020B0604020202020204" pitchFamily="34" charset="0"/>
+              <a:buChar char="•"/>
+              <a:defRPr sz="2000" kern="1200">
+                <a:solidFill>
+                  <a:schemeClr val="tx1"/>
+                </a:solidFill>
+                <a:latin typeface="+mn-lt"/>
+                <a:ea typeface="+mn-ea"/>
+                <a:cs typeface="+mn-cs"/>
+              </a:defRPr>
+            </a:lvl3pPr>
+            <a:lvl4pPr marL="1600200" indent="-228600" algn="l" defTabSz="914400" rtl="0" eaLnBrk="1" latinLnBrk="0" hangingPunct="1">
+              <a:lnSpc>
+                <a:spcPct val="90000"/>
+              </a:lnSpc>
+              <a:spcBef>
+                <a:spcPts val="500"/>
+              </a:spcBef>
+              <a:buFont typeface="Arial" panose="020B0604020202020204" pitchFamily="34" charset="0"/>
+              <a:buChar char="•"/>
+              <a:defRPr sz="1800" kern="1200">
+                <a:solidFill>
+                  <a:schemeClr val="tx1"/>
+                </a:solidFill>
+                <a:latin typeface="+mn-lt"/>
+                <a:ea typeface="+mn-ea"/>
+                <a:cs typeface="+mn-cs"/>
+              </a:defRPr>
+            </a:lvl4pPr>
+            <a:lvl5pPr marL="2057400" indent="-228600" algn="l" defTabSz="914400" rtl="0" eaLnBrk="1" latinLnBrk="0" hangingPunct="1">
+              <a:lnSpc>
+                <a:spcPct val="90000"/>
+              </a:lnSpc>
+              <a:spcBef>
+                <a:spcPts val="500"/>
+              </a:spcBef>
+              <a:buFont typeface="Arial" panose="020B0604020202020204" pitchFamily="34" charset="0"/>
+              <a:buChar char="•"/>
+              <a:defRPr sz="1800" kern="1200">
+                <a:solidFill>
+                  <a:schemeClr val="tx1"/>
+                </a:solidFill>
+                <a:latin typeface="+mn-lt"/>
+                <a:ea typeface="+mn-ea"/>
+                <a:cs typeface="+mn-cs"/>
+              </a:defRPr>
+            </a:lvl5pPr>
+            <a:lvl6pPr marL="2514600" indent="-228600" algn="l" defTabSz="914400" rtl="0" eaLnBrk="1" latinLnBrk="0" hangingPunct="1">
+              <a:lnSpc>
+                <a:spcPct val="90000"/>
+              </a:lnSpc>
+              <a:spcBef>
+                <a:spcPts val="500"/>
+              </a:spcBef>
+              <a:buFont typeface="Arial" panose="020B0604020202020204" pitchFamily="34" charset="0"/>
+              <a:buChar char="•"/>
+              <a:defRPr sz="1800" kern="1200">
+                <a:solidFill>
+                  <a:schemeClr val="tx1"/>
+                </a:solidFill>
+                <a:latin typeface="+mn-lt"/>
+                <a:ea typeface="+mn-ea"/>
+                <a:cs typeface="+mn-cs"/>
+              </a:defRPr>
+            </a:lvl6pPr>
+            <a:lvl7pPr marL="2971800" indent="-228600" algn="l" defTabSz="914400" rtl="0" eaLnBrk="1" latinLnBrk="0" hangingPunct="1">
+              <a:lnSpc>
+                <a:spcPct val="90000"/>
+              </a:lnSpc>
+              <a:spcBef>
+                <a:spcPts val="500"/>
+              </a:spcBef>
+              <a:buFont typeface="Arial" panose="020B0604020202020204" pitchFamily="34" charset="0"/>
+              <a:buChar char="•"/>
+              <a:defRPr sz="1800" kern="1200">
+                <a:solidFill>
+                  <a:schemeClr val="tx1"/>
+                </a:solidFill>
+                <a:latin typeface="+mn-lt"/>
+                <a:ea typeface="+mn-ea"/>
+                <a:cs typeface="+mn-cs"/>
+              </a:defRPr>
+            </a:lvl7pPr>
+            <a:lvl8pPr marL="3429000" indent="-228600" algn="l" defTabSz="914400" rtl="0" eaLnBrk="1" latinLnBrk="0" hangingPunct="1">
+              <a:lnSpc>
+                <a:spcPct val="90000"/>
+              </a:lnSpc>
+              <a:spcBef>
+                <a:spcPts val="500"/>
+              </a:spcBef>
+              <a:buFont typeface="Arial" panose="020B0604020202020204" pitchFamily="34" charset="0"/>
+              <a:buChar char="•"/>
+              <a:defRPr sz="1800" kern="1200">
+                <a:solidFill>
+                  <a:schemeClr val="tx1"/>
+                </a:solidFill>
+                <a:latin typeface="+mn-lt"/>
+                <a:ea typeface="+mn-ea"/>
+                <a:cs typeface="+mn-cs"/>
+              </a:defRPr>
+            </a:lvl8pPr>
+            <a:lvl9pPr marL="3886200" indent="-228600" algn="l" defTabSz="914400" rtl="0" eaLnBrk="1" latinLnBrk="0" hangingPunct="1">
+              <a:lnSpc>
+                <a:spcPct val="90000"/>
+              </a:lnSpc>
+              <a:spcBef>
+                <a:spcPts val="500"/>
+              </a:spcBef>
+              <a:buFont typeface="Arial" panose="020B0604020202020204" pitchFamily="34" charset="0"/>
+              <a:buChar char="•"/>
+              <a:defRPr sz="1800" kern="1200">
+                <a:solidFill>
+                  <a:schemeClr val="tx1"/>
+                </a:solidFill>
+                <a:latin typeface="+mn-lt"/>
+                <a:ea typeface="+mn-ea"/>
+                <a:cs typeface="+mn-cs"/>
+              </a:defRPr>
+            </a:lvl9pPr>
+          </a:lstStyle>
+          <a:p>
+            <a:pPr marL="0" indent="0">
+              <a:buNone/>
+            </a:pPr>
+            <a:r>
+              <a:rPr lang="en-US" sz="2400" dirty="0"/>
+              <a:t>*Disclaimer</a:t>
+            </a:r>
+          </a:p>
+          <a:p>
+            <a:r>
+              <a:rPr lang="en-US" sz="2400" dirty="0"/>
+              <a:t>No one knows about the future. That’s it. </a:t>
+            </a:r>
+          </a:p>
+          <a:p>
+            <a:r>
+              <a:rPr lang="en-US" sz="2400" dirty="0"/>
+              <a:t>We can just speculate and prepare accordingly. </a:t>
+            </a:r>
+          </a:p>
+          <a:p>
+            <a:r>
+              <a:rPr lang="en-US" sz="2400" dirty="0"/>
+              <a:t>Accept the following content, only if you like. </a:t>
+            </a:r>
+          </a:p>
+          <a:p>
+            <a:r>
+              <a:rPr lang="en-US" sz="2400" dirty="0"/>
+              <a:t>Basically, be your own judge.</a:t>
             </a:r>
           </a:p>
         </p:txBody>
@@ -4011,7 +4726,7 @@
     </p:spTree>
     <p:extLst>
       <p:ext uri="{BB962C8B-B14F-4D97-AF65-F5344CB8AC3E}">
-        <p14:creationId xmlns:p14="http://schemas.microsoft.com/office/powerpoint/2010/main" val="2786094835"/>
+        <p14:creationId xmlns:p14="http://schemas.microsoft.com/office/powerpoint/2010/main" val="366006817"/>
       </p:ext>
     </p:extLst>
   </p:cSld>
@@ -4043,7 +4758,7 @@
           <p:cNvPr id="2" name="Title 1">
             <a:extLst>
               <a:ext uri="{FF2B5EF4-FFF2-40B4-BE49-F238E27FC236}">
-                <a16:creationId xmlns:a16="http://schemas.microsoft.com/office/drawing/2014/main" id="{63D40543-BC75-4773-AF53-D5276182D25E}"/>
+                <a16:creationId xmlns:a16="http://schemas.microsoft.com/office/drawing/2014/main" id="{E91125B2-D183-499C-9CD5-ECE0ECD5039E}"/>
               </a:ext>
             </a:extLst>
           </p:cNvPr>
@@ -4061,65 +4776,43 @@
           <a:p>
             <a:r>
               <a:rPr lang="en-US" dirty="0"/>
-              <a:t>Agenda*</a:t>
-            </a:r>
-          </a:p>
-        </p:txBody>
-      </p:sp>
-      <p:sp>
-        <p:nvSpPr>
-          <p:cNvPr id="3" name="Content Placeholder 2">
-            <a:extLst>
-              <a:ext uri="{FF2B5EF4-FFF2-40B4-BE49-F238E27FC236}">
-                <a16:creationId xmlns:a16="http://schemas.microsoft.com/office/drawing/2014/main" id="{950ADC3F-103E-494F-AC14-A9CD23DA1717}"/>
-              </a:ext>
-            </a:extLst>
-          </p:cNvPr>
-          <p:cNvSpPr>
-            <a:spLocks noGrp="1"/>
-          </p:cNvSpPr>
-          <p:nvPr>
-            <p:ph idx="1"/>
+              <a:t>Hype Cycles</a:t>
+            </a:r>
+          </a:p>
+        </p:txBody>
+      </p:sp>
+      <p:sp>
+        <p:nvSpPr>
+          <p:cNvPr id="3" name="Text Placeholder 2">
+            <a:extLst>
+              <a:ext uri="{FF2B5EF4-FFF2-40B4-BE49-F238E27FC236}">
+                <a16:creationId xmlns:a16="http://schemas.microsoft.com/office/drawing/2014/main" id="{329E6170-18A0-4B11-8AA7-49091AC80AC9}"/>
+              </a:ext>
+            </a:extLst>
+          </p:cNvPr>
+          <p:cNvSpPr>
+            <a:spLocks noGrp="1"/>
+          </p:cNvSpPr>
+          <p:nvPr>
+            <p:ph type="body" idx="1"/>
           </p:nvPr>
         </p:nvSpPr>
         <p:spPr/>
         <p:txBody>
-          <a:bodyPr>
-            <a:normAutofit/>
-          </a:bodyPr>
-          <a:lstStyle/>
-          <a:p>
-            <a:pPr marL="514350" indent="-514350">
-              <a:buFont typeface="+mj-lt"/>
-              <a:buAutoNum type="arabicPeriod"/>
-            </a:pPr>
+          <a:bodyPr/>
+          <a:lstStyle/>
+          <a:p>
             <a:r>
               <a:rPr lang="en-US" dirty="0"/>
-              <a:t>Emerging Technologies</a:t>
-            </a:r>
-          </a:p>
-          <a:p>
-            <a:pPr marL="514350" indent="-514350">
-              <a:buFont typeface="+mj-lt"/>
-              <a:buAutoNum type="arabicPeriod"/>
-            </a:pPr>
-            <a:r>
-              <a:rPr lang="en-US" dirty="0"/>
-              <a:t>How to prepare?</a:t>
-            </a:r>
-          </a:p>
-          <a:p>
-            <a:pPr marL="0" indent="0">
-              <a:buNone/>
-            </a:pPr>
-            <a:endParaRPr lang="en-US" dirty="0"/>
+              <a:t>What is the future? </a:t>
+            </a:r>
           </a:p>
         </p:txBody>
       </p:sp>
     </p:spTree>
     <p:extLst>
       <p:ext uri="{BB962C8B-B14F-4D97-AF65-F5344CB8AC3E}">
-        <p14:creationId xmlns:p14="http://schemas.microsoft.com/office/powerpoint/2010/main" val="366006817"/>
+        <p14:creationId xmlns:p14="http://schemas.microsoft.com/office/powerpoint/2010/main" val="2970192805"/>
       </p:ext>
     </p:extLst>
   </p:cSld>
@@ -4151,7 +4844,7 @@
           <p:cNvPr id="2" name="Title 1">
             <a:extLst>
               <a:ext uri="{FF2B5EF4-FFF2-40B4-BE49-F238E27FC236}">
-                <a16:creationId xmlns:a16="http://schemas.microsoft.com/office/drawing/2014/main" id="{63D40543-BC75-4773-AF53-D5276182D25E}"/>
+                <a16:creationId xmlns:a16="http://schemas.microsoft.com/office/drawing/2014/main" id="{9703EC34-C6B1-4A24-A05A-F43FBEB9B396}"/>
               </a:ext>
             </a:extLst>
           </p:cNvPr>
@@ -4169,7 +4862,7 @@
           <a:p>
             <a:r>
               <a:rPr lang="en-US" dirty="0"/>
-              <a:t>*Disclaimer</a:t>
+              <a:t>What is a Hype Cycle?</a:t>
             </a:r>
           </a:p>
         </p:txBody>
@@ -4179,7 +4872,7 @@
           <p:cNvPr id="3" name="Content Placeholder 2">
             <a:extLst>
               <a:ext uri="{FF2B5EF4-FFF2-40B4-BE49-F238E27FC236}">
-                <a16:creationId xmlns:a16="http://schemas.microsoft.com/office/drawing/2014/main" id="{950ADC3F-103E-494F-AC14-A9CD23DA1717}"/>
+                <a16:creationId xmlns:a16="http://schemas.microsoft.com/office/drawing/2014/main" id="{3629E8E8-DE76-4BD0-8381-A05BF25F2DB9}"/>
               </a:ext>
             </a:extLst>
           </p:cNvPr>
@@ -4198,20 +4891,26 @@
           <a:lstStyle/>
           <a:p>
             <a:r>
-              <a:rPr lang="en-US" sz="2400" dirty="0"/>
-              <a:t>No one knows about the future. That’s it. </a:t>
-            </a:r>
-          </a:p>
-          <a:p>
-            <a:r>
-              <a:rPr lang="en-US" sz="2400" dirty="0"/>
-              <a:t>We can just speculate and prepare accordingly. </a:t>
-            </a:r>
-          </a:p>
-          <a:p>
-            <a:r>
-              <a:rPr lang="en-US" sz="2400" dirty="0"/>
-              <a:t>Accept the content, only if you like. Be your own judge.</a:t>
+              <a:rPr lang="en-US" dirty="0"/>
+              <a:t>Popularized by Gartner</a:t>
+            </a:r>
+          </a:p>
+          <a:p>
+            <a:r>
+              <a:rPr lang="en-US" dirty="0"/>
+              <a:t>Publishing Hype Cycles &gt; 2 decades</a:t>
+            </a:r>
+          </a:p>
+          <a:p>
+            <a:r>
+              <a:rPr lang="en-US" dirty="0"/>
+              <a:t>Oﬀers a snapshot and a trend of relative maturity of the technology.</a:t>
+            </a:r>
+          </a:p>
+          <a:p>
+            <a:r>
+              <a:rPr lang="en-US" dirty="0"/>
+              <a:t>Assessment of Hype and Maturity</a:t>
             </a:r>
           </a:p>
         </p:txBody>
@@ -4219,7 +4918,7 @@
     </p:spTree>
     <p:extLst>
       <p:ext uri="{BB962C8B-B14F-4D97-AF65-F5344CB8AC3E}">
-        <p14:creationId xmlns:p14="http://schemas.microsoft.com/office/powerpoint/2010/main" val="979304728"/>
+        <p14:creationId xmlns:p14="http://schemas.microsoft.com/office/powerpoint/2010/main" val="974748860"/>
       </p:ext>
     </p:extLst>
   </p:cSld>
@@ -4251,7 +4950,7 @@
           <p:cNvPr id="2" name="Title 1">
             <a:extLst>
               <a:ext uri="{FF2B5EF4-FFF2-40B4-BE49-F238E27FC236}">
-                <a16:creationId xmlns:a16="http://schemas.microsoft.com/office/drawing/2014/main" id="{E91125B2-D183-499C-9CD5-ECE0ECD5039E}"/>
+                <a16:creationId xmlns:a16="http://schemas.microsoft.com/office/drawing/2014/main" id="{9703EC34-C6B1-4A24-A05A-F43FBEB9B396}"/>
               </a:ext>
             </a:extLst>
           </p:cNvPr>
@@ -4269,35 +4968,48 @@
           <a:p>
             <a:r>
               <a:rPr lang="en-US" dirty="0"/>
-              <a:t>Emerging Technologies</a:t>
-            </a:r>
-          </a:p>
-        </p:txBody>
-      </p:sp>
-      <p:sp>
-        <p:nvSpPr>
-          <p:cNvPr id="3" name="Text Placeholder 2">
-            <a:extLst>
-              <a:ext uri="{FF2B5EF4-FFF2-40B4-BE49-F238E27FC236}">
-                <a16:creationId xmlns:a16="http://schemas.microsoft.com/office/drawing/2014/main" id="{329E6170-18A0-4B11-8AA7-49091AC80AC9}"/>
-              </a:ext>
-            </a:extLst>
-          </p:cNvPr>
-          <p:cNvSpPr>
-            <a:spLocks noGrp="1"/>
-          </p:cNvSpPr>
-          <p:nvPr>
-            <p:ph type="body" idx="1"/>
+              <a:t>Definition</a:t>
+            </a:r>
+          </a:p>
+        </p:txBody>
+      </p:sp>
+      <p:sp>
+        <p:nvSpPr>
+          <p:cNvPr id="3" name="Content Placeholder 2">
+            <a:extLst>
+              <a:ext uri="{FF2B5EF4-FFF2-40B4-BE49-F238E27FC236}">
+                <a16:creationId xmlns:a16="http://schemas.microsoft.com/office/drawing/2014/main" id="{3629E8E8-DE76-4BD0-8381-A05BF25F2DB9}"/>
+              </a:ext>
+            </a:extLst>
+          </p:cNvPr>
+          <p:cNvSpPr>
+            <a:spLocks noGrp="1"/>
+          </p:cNvSpPr>
+          <p:nvPr>
+            <p:ph idx="1"/>
           </p:nvPr>
         </p:nvSpPr>
         <p:spPr/>
         <p:txBody>
-          <a:bodyPr/>
-          <a:lstStyle/>
-          <a:p>
+          <a:bodyPr>
+            <a:normAutofit/>
+          </a:bodyPr>
+          <a:lstStyle/>
+          <a:p>
+            <a:pPr marL="0" indent="0" algn="ctr">
+              <a:buNone/>
+            </a:pPr>
             <a:r>
               <a:rPr lang="en-US" dirty="0"/>
-              <a:t>The Hype cycles</a:t>
+              <a:t> -- “</a:t>
+            </a:r>
+            <a:r>
+              <a:rPr lang="en-US" i="1" dirty="0"/>
+              <a:t>The Gartner Hype Cycle is a device that lays out the path that technologies generally take, from their initial introduction into the market until their eventual maturation into useful components of broader solutions</a:t>
+            </a:r>
+            <a:r>
+              <a:rPr lang="en-US" dirty="0"/>
+              <a:t>” --</a:t>
             </a:r>
           </a:p>
         </p:txBody>
@@ -4305,7 +5017,7 @@
     </p:spTree>
     <p:extLst>
       <p:ext uri="{BB962C8B-B14F-4D97-AF65-F5344CB8AC3E}">
-        <p14:creationId xmlns:p14="http://schemas.microsoft.com/office/powerpoint/2010/main" val="2970192805"/>
+        <p14:creationId xmlns:p14="http://schemas.microsoft.com/office/powerpoint/2010/main" val="1205873874"/>
       </p:ext>
     </p:extLst>
   </p:cSld>
@@ -4332,6 +5044,212 @@
           <a:chExt cx="0" cy="0"/>
         </a:xfrm>
       </p:grpSpPr>
+      <p:pic>
+        <p:nvPicPr>
+          <p:cNvPr id="5" name="Picture 4" descr="Diagram&#10;&#10;Description automatically generated">
+            <a:extLst>
+              <a:ext uri="{FF2B5EF4-FFF2-40B4-BE49-F238E27FC236}">
+                <a16:creationId xmlns:a16="http://schemas.microsoft.com/office/drawing/2014/main" id="{0BEB03B2-1A38-4E58-AE3E-AF65187509C8}"/>
+              </a:ext>
+            </a:extLst>
+          </p:cNvPr>
+          <p:cNvPicPr>
+            <a:picLocks noChangeAspect="1"/>
+          </p:cNvPicPr>
+          <p:nvPr/>
+        </p:nvPicPr>
+        <p:blipFill>
+          <a:blip r:embed="rId2">
+            <a:extLst>
+              <a:ext uri="{28A0092B-C50C-407E-A947-70E740481C1C}">
+                <a14:useLocalDpi xmlns:a14="http://schemas.microsoft.com/office/drawing/2010/main" val="0"/>
+              </a:ext>
+            </a:extLst>
+          </a:blip>
+          <a:stretch>
+            <a:fillRect/>
+          </a:stretch>
+        </p:blipFill>
+        <p:spPr>
+          <a:xfrm>
+            <a:off x="3776319" y="1207167"/>
+            <a:ext cx="7200000" cy="5427355"/>
+          </a:xfrm>
+          <a:prstGeom prst="rect">
+            <a:avLst/>
+          </a:prstGeom>
+        </p:spPr>
+      </p:pic>
+      <p:sp>
+        <p:nvSpPr>
+          <p:cNvPr id="6" name="Title 5">
+            <a:extLst>
+              <a:ext uri="{FF2B5EF4-FFF2-40B4-BE49-F238E27FC236}">
+                <a16:creationId xmlns:a16="http://schemas.microsoft.com/office/drawing/2014/main" id="{87BD42ED-5AB2-4951-A72A-65837373C9C9}"/>
+              </a:ext>
+            </a:extLst>
+          </p:cNvPr>
+          <p:cNvSpPr>
+            <a:spLocks noGrp="1"/>
+          </p:cNvSpPr>
+          <p:nvPr>
+            <p:ph type="title"/>
+          </p:nvPr>
+        </p:nvSpPr>
+        <p:spPr/>
+        <p:txBody>
+          <a:bodyPr/>
+          <a:lstStyle/>
+          <a:p>
+            <a:r>
+              <a:rPr lang="en-US" dirty="0"/>
+              <a:t>Phases</a:t>
+            </a:r>
+          </a:p>
+        </p:txBody>
+      </p:sp>
+    </p:spTree>
+    <p:extLst>
+      <p:ext uri="{BB962C8B-B14F-4D97-AF65-F5344CB8AC3E}">
+        <p14:creationId xmlns:p14="http://schemas.microsoft.com/office/powerpoint/2010/main" val="3578215080"/>
+      </p:ext>
+    </p:extLst>
+  </p:cSld>
+  <p:clrMapOvr>
+    <a:masterClrMapping/>
+  </p:clrMapOvr>
+</p:sld>
+</file>
+
+<file path=ppt/slides/slide8.xml><?xml version="1.0" encoding="utf-8"?>
+<p:sld xmlns:a="http://schemas.openxmlformats.org/drawingml/2006/main" xmlns:r="http://schemas.openxmlformats.org/officeDocument/2006/relationships" xmlns:p="http://schemas.openxmlformats.org/presentationml/2006/main">
+  <p:cSld>
+    <p:spTree>
+      <p:nvGrpSpPr>
+        <p:cNvPr id="1" name=""/>
+        <p:cNvGrpSpPr/>
+        <p:nvPr/>
+      </p:nvGrpSpPr>
+      <p:grpSpPr>
+        <a:xfrm>
+          <a:off x="0" y="0"/>
+          <a:ext cx="0" cy="0"/>
+          <a:chOff x="0" y="0"/>
+          <a:chExt cx="0" cy="0"/>
+        </a:xfrm>
+      </p:grpSpPr>
+      <p:pic>
+        <p:nvPicPr>
+          <p:cNvPr id="3074" name="Picture 2" descr="5 Trends Drive the Gartner Hype Cycle for Emerging Technologies, 2020">
+            <a:extLst>
+              <a:ext uri="{FF2B5EF4-FFF2-40B4-BE49-F238E27FC236}">
+                <a16:creationId xmlns:a16="http://schemas.microsoft.com/office/drawing/2014/main" id="{06978CAA-EE3F-45F4-B5A9-BDC6C90BD681}"/>
+              </a:ext>
+            </a:extLst>
+          </p:cNvPr>
+          <p:cNvPicPr>
+            <a:picLocks noChangeAspect="1" noChangeArrowheads="1"/>
+          </p:cNvPicPr>
+          <p:nvPr/>
+        </p:nvPicPr>
+        <p:blipFill>
+          <a:blip r:embed="rId2">
+            <a:extLst>
+              <a:ext uri="{28A0092B-C50C-407E-A947-70E740481C1C}">
+                <a14:useLocalDpi xmlns:a14="http://schemas.microsoft.com/office/drawing/2010/main" val="0"/>
+              </a:ext>
+            </a:extLst>
+          </a:blip>
+          <a:srcRect/>
+          <a:stretch>
+            <a:fillRect/>
+          </a:stretch>
+        </p:blipFill>
+        <p:spPr bwMode="auto">
+          <a:xfrm>
+            <a:off x="135107" y="0"/>
+            <a:ext cx="7212013" cy="6858000"/>
+          </a:xfrm>
+          <a:prstGeom prst="rect">
+            <a:avLst/>
+          </a:prstGeom>
+          <a:noFill/>
+          <a:extLst>
+            <a:ext uri="{909E8E84-426E-40DD-AFC4-6F175D3DCCD1}">
+              <a14:hiddenFill xmlns:a14="http://schemas.microsoft.com/office/drawing/2010/main">
+                <a:solidFill>
+                  <a:srgbClr val="FFFFFF"/>
+                </a:solidFill>
+              </a14:hiddenFill>
+            </a:ext>
+          </a:extLst>
+        </p:spPr>
+      </p:pic>
+      <p:pic>
+        <p:nvPicPr>
+          <p:cNvPr id="4" name="Picture 3">
+            <a:extLst>
+              <a:ext uri="{FF2B5EF4-FFF2-40B4-BE49-F238E27FC236}">
+                <a16:creationId xmlns:a16="http://schemas.microsoft.com/office/drawing/2014/main" id="{5426317E-83E3-4CFA-A4EB-2F19F69C3CEC}"/>
+              </a:ext>
+            </a:extLst>
+          </p:cNvPr>
+          <p:cNvPicPr>
+            <a:picLocks noChangeAspect="1"/>
+          </p:cNvPicPr>
+          <p:nvPr/>
+        </p:nvPicPr>
+        <p:blipFill>
+          <a:blip r:embed="rId3"/>
+          <a:stretch>
+            <a:fillRect/>
+          </a:stretch>
+        </p:blipFill>
+        <p:spPr>
+          <a:xfrm>
+            <a:off x="6276434" y="480224"/>
+            <a:ext cx="5400000" cy="2365116"/>
+          </a:xfrm>
+          <a:prstGeom prst="rect">
+            <a:avLst/>
+          </a:prstGeom>
+          <a:ln>
+            <a:solidFill>
+              <a:schemeClr val="tx1"/>
+            </a:solidFill>
+          </a:ln>
+        </p:spPr>
+      </p:pic>
+    </p:spTree>
+    <p:extLst>
+      <p:ext uri="{BB962C8B-B14F-4D97-AF65-F5344CB8AC3E}">
+        <p14:creationId xmlns:p14="http://schemas.microsoft.com/office/powerpoint/2010/main" val="655363463"/>
+      </p:ext>
+    </p:extLst>
+  </p:cSld>
+  <p:clrMapOvr>
+    <a:masterClrMapping/>
+  </p:clrMapOvr>
+</p:sld>
+</file>
+
+<file path=ppt/slides/slide9.xml><?xml version="1.0" encoding="utf-8"?>
+<p:sld xmlns:a="http://schemas.openxmlformats.org/drawingml/2006/main" xmlns:r="http://schemas.openxmlformats.org/officeDocument/2006/relationships" xmlns:p="http://schemas.openxmlformats.org/presentationml/2006/main">
+  <p:cSld>
+    <p:spTree>
+      <p:nvGrpSpPr>
+        <p:cNvPr id="1" name=""/>
+        <p:cNvGrpSpPr/>
+        <p:nvPr/>
+      </p:nvGrpSpPr>
+      <p:grpSpPr>
+        <a:xfrm>
+          <a:off x="0" y="0"/>
+          <a:ext cx="0" cy="0"/>
+          <a:chOff x="0" y="0"/>
+          <a:chExt cx="0" cy="0"/>
+        </a:xfrm>
+      </p:grpSpPr>
       <p:sp>
         <p:nvSpPr>
           <p:cNvPr id="2" name="Title 1">
@@ -4355,7 +5273,7 @@
           <a:p>
             <a:r>
               <a:rPr lang="en-US" dirty="0"/>
-              <a:t>How to prepare?</a:t>
+              <a:t>IKIGAI</a:t>
             </a:r>
           </a:p>
         </p:txBody>
@@ -4383,7 +5301,7 @@
           <a:p>
             <a:r>
               <a:rPr lang="en-US" dirty="0"/>
-              <a:t>Unsolicited advice</a:t>
+              <a:t>How to prepare for the future?</a:t>
             </a:r>
           </a:p>
         </p:txBody>

</xml_diff>